<commit_message>
Working on old_school documentation
</commit_message>
<xml_diff>
--- a/tutorial/sketch.pptx
+++ b/tutorial/sketch.pptx
@@ -104,7 +104,97 @@
       </a:defRPr>
     </a:lvl9pPr>
   </p:defaultTextStyle>
+  <p:extLst>
+    <p:ext uri="{EFAFB233-063F-42B5-8137-9DF3F51BA10A}">
+      <p15:sldGuideLst xmlns:p15="http://schemas.microsoft.com/office/powerpoint/2012/main"/>
+    </p:ext>
+  </p:extLst>
 </p:presentation>
+</file>
+
+<file path=ppt/changesInfos/changesInfo1.xml><?xml version="1.0" encoding="utf-8"?>
+<pc:chgInfo xmlns:a="http://schemas.openxmlformats.org/drawingml/2006/main" xmlns:r="http://schemas.openxmlformats.org/officeDocument/2006/relationships" xmlns:ac="http://schemas.microsoft.com/office/drawing/2013/main/command" xmlns:pc="http://schemas.microsoft.com/office/powerpoint/2013/main/command">
+  <pc:docChgLst>
+    <pc:chgData name="Arthur Richards" userId="9bbc7d88-dc76-4252-a227-954969c11068" providerId="ADAL" clId="{2FE6326C-FEE7-440F-A985-F8ED10F916B3}"/>
+    <pc:docChg chg="custSel modSld">
+      <pc:chgData name="Arthur Richards" userId="9bbc7d88-dc76-4252-a227-954969c11068" providerId="ADAL" clId="{2FE6326C-FEE7-440F-A985-F8ED10F916B3}" dt="2022-01-07T13:49:09.369" v="8" actId="1076"/>
+      <pc:docMkLst>
+        <pc:docMk/>
+      </pc:docMkLst>
+      <pc:sldChg chg="delSp modSp mod">
+        <pc:chgData name="Arthur Richards" userId="9bbc7d88-dc76-4252-a227-954969c11068" providerId="ADAL" clId="{2FE6326C-FEE7-440F-A985-F8ED10F916B3}" dt="2022-01-07T13:49:09.369" v="8" actId="1076"/>
+        <pc:sldMkLst>
+          <pc:docMk/>
+          <pc:sldMk cId="4272711254" sldId="256"/>
+        </pc:sldMkLst>
+        <pc:spChg chg="mod">
+          <ac:chgData name="Arthur Richards" userId="9bbc7d88-dc76-4252-a227-954969c11068" providerId="ADAL" clId="{2FE6326C-FEE7-440F-A985-F8ED10F916B3}" dt="2022-01-07T13:48:53.024" v="4" actId="1076"/>
+          <ac:spMkLst>
+            <pc:docMk/>
+            <pc:sldMk cId="4272711254" sldId="256"/>
+            <ac:spMk id="4" creationId="{EFC5819C-53BD-419B-8437-279F5D892082}"/>
+          </ac:spMkLst>
+        </pc:spChg>
+        <pc:spChg chg="mod">
+          <ac:chgData name="Arthur Richards" userId="9bbc7d88-dc76-4252-a227-954969c11068" providerId="ADAL" clId="{2FE6326C-FEE7-440F-A985-F8ED10F916B3}" dt="2022-01-07T13:48:31.312" v="0" actId="1076"/>
+          <ac:spMkLst>
+            <pc:docMk/>
+            <pc:sldMk cId="4272711254" sldId="256"/>
+            <ac:spMk id="8" creationId="{7A7830B0-F4FA-4917-B89F-485DB233C8A6}"/>
+          </ac:spMkLst>
+        </pc:spChg>
+        <pc:spChg chg="mod">
+          <ac:chgData name="Arthur Richards" userId="9bbc7d88-dc76-4252-a227-954969c11068" providerId="ADAL" clId="{2FE6326C-FEE7-440F-A985-F8ED10F916B3}" dt="2022-01-07T13:49:09.369" v="8" actId="1076"/>
+          <ac:spMkLst>
+            <pc:docMk/>
+            <pc:sldMk cId="4272711254" sldId="256"/>
+            <ac:spMk id="12" creationId="{EC64BE61-DA9C-45F5-80B6-C574DB9692F3}"/>
+          </ac:spMkLst>
+        </pc:spChg>
+        <pc:spChg chg="mod">
+          <ac:chgData name="Arthur Richards" userId="9bbc7d88-dc76-4252-a227-954969c11068" providerId="ADAL" clId="{2FE6326C-FEE7-440F-A985-F8ED10F916B3}" dt="2022-01-07T13:49:04.203" v="7" actId="1076"/>
+          <ac:spMkLst>
+            <pc:docMk/>
+            <pc:sldMk cId="4272711254" sldId="256"/>
+            <ac:spMk id="16" creationId="{18733315-481B-47D6-9141-9389C95500FF}"/>
+          </ac:spMkLst>
+        </pc:spChg>
+        <pc:cxnChg chg="mod">
+          <ac:chgData name="Arthur Richards" userId="9bbc7d88-dc76-4252-a227-954969c11068" providerId="ADAL" clId="{2FE6326C-FEE7-440F-A985-F8ED10F916B3}" dt="2022-01-07T13:48:58.276" v="6" actId="14100"/>
+          <ac:cxnSpMkLst>
+            <pc:docMk/>
+            <pc:sldMk cId="4272711254" sldId="256"/>
+            <ac:cxnSpMk id="31" creationId="{1E7137F6-AD11-4E9C-BB79-0B8CB84356B7}"/>
+          </ac:cxnSpMkLst>
+        </pc:cxnChg>
+        <pc:cxnChg chg="del mod">
+          <ac:chgData name="Arthur Richards" userId="9bbc7d88-dc76-4252-a227-954969c11068" providerId="ADAL" clId="{2FE6326C-FEE7-440F-A985-F8ED10F916B3}" dt="2022-01-07T13:48:38.539" v="1" actId="478"/>
+          <ac:cxnSpMkLst>
+            <pc:docMk/>
+            <pc:sldMk cId="4272711254" sldId="256"/>
+            <ac:cxnSpMk id="39" creationId="{70B63D74-6C1D-4700-9E18-9E5EE6FF2E28}"/>
+          </ac:cxnSpMkLst>
+        </pc:cxnChg>
+        <pc:cxnChg chg="del mod">
+          <ac:chgData name="Arthur Richards" userId="9bbc7d88-dc76-4252-a227-954969c11068" providerId="ADAL" clId="{2FE6326C-FEE7-440F-A985-F8ED10F916B3}" dt="2022-01-07T13:48:41.947" v="3" actId="478"/>
+          <ac:cxnSpMkLst>
+            <pc:docMk/>
+            <pc:sldMk cId="4272711254" sldId="256"/>
+            <ac:cxnSpMk id="40" creationId="{BDEE400A-0DE2-49B7-8F72-9DFBF7654F3C}"/>
+          </ac:cxnSpMkLst>
+        </pc:cxnChg>
+        <pc:cxnChg chg="del mod">
+          <ac:chgData name="Arthur Richards" userId="9bbc7d88-dc76-4252-a227-954969c11068" providerId="ADAL" clId="{2FE6326C-FEE7-440F-A985-F8ED10F916B3}" dt="2022-01-07T13:48:40.355" v="2" actId="478"/>
+          <ac:cxnSpMkLst>
+            <pc:docMk/>
+            <pc:sldMk cId="4272711254" sldId="256"/>
+            <ac:cxnSpMk id="43" creationId="{8A398D92-ABAA-4F9C-AF68-263AA9B12862}"/>
+          </ac:cxnSpMkLst>
+        </pc:cxnChg>
+      </pc:sldChg>
+    </pc:docChg>
+  </pc:docChgLst>
+</pc:chgInfo>
 </file>
 
 <file path=ppt/slideLayouts/slideLayout1.xml><?xml version="1.0" encoding="utf-8"?>
@@ -256,7 +346,7 @@
           <a:p>
             <a:fld id="{FC20C6D0-2F14-4B19-A692-CABB66D824D4}" type="datetimeFigureOut">
               <a:rPr lang="en-GB" smtClean="0"/>
-              <a:t>06/01/2022</a:t>
+              <a:t>07/01/2022</a:t>
             </a:fld>
             <a:endParaRPr lang="en-GB"/>
           </a:p>
@@ -456,7 +546,7 @@
           <a:p>
             <a:fld id="{FC20C6D0-2F14-4B19-A692-CABB66D824D4}" type="datetimeFigureOut">
               <a:rPr lang="en-GB" smtClean="0"/>
-              <a:t>06/01/2022</a:t>
+              <a:t>07/01/2022</a:t>
             </a:fld>
             <a:endParaRPr lang="en-GB"/>
           </a:p>
@@ -666,7 +756,7 @@
           <a:p>
             <a:fld id="{FC20C6D0-2F14-4B19-A692-CABB66D824D4}" type="datetimeFigureOut">
               <a:rPr lang="en-GB" smtClean="0"/>
-              <a:t>06/01/2022</a:t>
+              <a:t>07/01/2022</a:t>
             </a:fld>
             <a:endParaRPr lang="en-GB"/>
           </a:p>
@@ -866,7 +956,7 @@
           <a:p>
             <a:fld id="{FC20C6D0-2F14-4B19-A692-CABB66D824D4}" type="datetimeFigureOut">
               <a:rPr lang="en-GB" smtClean="0"/>
-              <a:t>06/01/2022</a:t>
+              <a:t>07/01/2022</a:t>
             </a:fld>
             <a:endParaRPr lang="en-GB"/>
           </a:p>
@@ -1142,7 +1232,7 @@
           <a:p>
             <a:fld id="{FC20C6D0-2F14-4B19-A692-CABB66D824D4}" type="datetimeFigureOut">
               <a:rPr lang="en-GB" smtClean="0"/>
-              <a:t>06/01/2022</a:t>
+              <a:t>07/01/2022</a:t>
             </a:fld>
             <a:endParaRPr lang="en-GB"/>
           </a:p>
@@ -1410,7 +1500,7 @@
           <a:p>
             <a:fld id="{FC20C6D0-2F14-4B19-A692-CABB66D824D4}" type="datetimeFigureOut">
               <a:rPr lang="en-GB" smtClean="0"/>
-              <a:t>06/01/2022</a:t>
+              <a:t>07/01/2022</a:t>
             </a:fld>
             <a:endParaRPr lang="en-GB"/>
           </a:p>
@@ -1825,7 +1915,7 @@
           <a:p>
             <a:fld id="{FC20C6D0-2F14-4B19-A692-CABB66D824D4}" type="datetimeFigureOut">
               <a:rPr lang="en-GB" smtClean="0"/>
-              <a:t>06/01/2022</a:t>
+              <a:t>07/01/2022</a:t>
             </a:fld>
             <a:endParaRPr lang="en-GB"/>
           </a:p>
@@ -1967,7 +2057,7 @@
           <a:p>
             <a:fld id="{FC20C6D0-2F14-4B19-A692-CABB66D824D4}" type="datetimeFigureOut">
               <a:rPr lang="en-GB" smtClean="0"/>
-              <a:t>06/01/2022</a:t>
+              <a:t>07/01/2022</a:t>
             </a:fld>
             <a:endParaRPr lang="en-GB"/>
           </a:p>
@@ -2080,7 +2170,7 @@
           <a:p>
             <a:fld id="{FC20C6D0-2F14-4B19-A692-CABB66D824D4}" type="datetimeFigureOut">
               <a:rPr lang="en-GB" smtClean="0"/>
-              <a:t>06/01/2022</a:t>
+              <a:t>07/01/2022</a:t>
             </a:fld>
             <a:endParaRPr lang="en-GB"/>
           </a:p>
@@ -2393,7 +2483,7 @@
           <a:p>
             <a:fld id="{FC20C6D0-2F14-4B19-A692-CABB66D824D4}" type="datetimeFigureOut">
               <a:rPr lang="en-GB" smtClean="0"/>
-              <a:t>06/01/2022</a:t>
+              <a:t>07/01/2022</a:t>
             </a:fld>
             <a:endParaRPr lang="en-GB"/>
           </a:p>
@@ -2682,7 +2772,7 @@
           <a:p>
             <a:fld id="{FC20C6D0-2F14-4B19-A692-CABB66D824D4}" type="datetimeFigureOut">
               <a:rPr lang="en-GB" smtClean="0"/>
-              <a:t>06/01/2022</a:t>
+              <a:t>07/01/2022</a:t>
             </a:fld>
             <a:endParaRPr lang="en-GB"/>
           </a:p>
@@ -2925,7 +3015,7 @@
           <a:p>
             <a:fld id="{FC20C6D0-2F14-4B19-A692-CABB66D824D4}" type="datetimeFigureOut">
               <a:rPr lang="en-GB" smtClean="0"/>
-              <a:t>06/01/2022</a:t>
+              <a:t>07/01/2022</a:t>
             </a:fld>
             <a:endParaRPr lang="en-GB"/>
           </a:p>
@@ -3356,7 +3446,7 @@
         </p:nvSpPr>
         <p:spPr>
           <a:xfrm>
-            <a:off x="7996028" y="1016715"/>
+            <a:off x="10946084" y="3032482"/>
             <a:ext cx="1847850" cy="1377595"/>
           </a:xfrm>
           <a:prstGeom prst="roundRect">
@@ -3600,7 +3690,7 @@
         </p:nvSpPr>
         <p:spPr>
           <a:xfrm>
-            <a:off x="2095916" y="1016715"/>
+            <a:off x="-854140" y="3032482"/>
             <a:ext cx="1847850" cy="1377594"/>
           </a:xfrm>
           <a:prstGeom prst="roundRect">
@@ -3707,7 +3797,7 @@
         </p:nvSpPr>
         <p:spPr>
           <a:xfrm>
-            <a:off x="6868318" y="3351947"/>
+            <a:off x="6868319" y="3244334"/>
             <a:ext cx="1153213" cy="369332"/>
           </a:xfrm>
           <a:prstGeom prst="rect">
@@ -3743,7 +3833,7 @@
         </p:nvSpPr>
         <p:spPr>
           <a:xfrm>
-            <a:off x="8808415" y="2528730"/>
+            <a:off x="9792871" y="3244334"/>
             <a:ext cx="1153213" cy="369332"/>
           </a:xfrm>
           <a:prstGeom prst="rect">
@@ -3776,15 +3866,15 @@
           </p:cNvPr>
           <p:cNvCxnSpPr>
             <a:cxnSpLocks/>
-            <a:stCxn id="5" idx="0"/>
-            <a:endCxn id="4" idx="2"/>
+            <a:stCxn id="5" idx="3"/>
+            <a:endCxn id="4" idx="1"/>
           </p:cNvCxnSpPr>
           <p:nvPr/>
         </p:nvCxnSpPr>
         <p:spPr>
-          <a:xfrm flipV="1">
-            <a:off x="8919953" y="2394310"/>
-            <a:ext cx="0" cy="638173"/>
+          <a:xfrm>
+            <a:off x="9843878" y="3721280"/>
+            <a:ext cx="1102206" cy="0"/>
           </a:xfrm>
           <a:prstGeom prst="line">
             <a:avLst/>
@@ -3808,125 +3898,6 @@
           </a:fillRef>
           <a:effectRef idx="2">
             <a:schemeClr val="dk1"/>
-          </a:effectRef>
-          <a:fontRef idx="minor">
-            <a:schemeClr val="tx1"/>
-          </a:fontRef>
-        </p:style>
-      </p:cxnSp>
-      <p:cxnSp>
-        <p:nvCxnSpPr>
-          <p:cNvPr id="39" name="Straight Connector 38">
-            <a:extLst>
-              <a:ext uri="{FF2B5EF4-FFF2-40B4-BE49-F238E27FC236}">
-                <a16:creationId xmlns:a16="http://schemas.microsoft.com/office/drawing/2014/main" id="{70B63D74-6C1D-4700-9E18-9E5EE6FF2E28}"/>
-              </a:ext>
-            </a:extLst>
-          </p:cNvPr>
-          <p:cNvCxnSpPr>
-            <a:stCxn id="8" idx="3"/>
-            <a:endCxn id="4" idx="1"/>
-          </p:cNvCxnSpPr>
-          <p:nvPr/>
-        </p:nvCxnSpPr>
-        <p:spPr>
-          <a:xfrm>
-            <a:off x="3943766" y="1705512"/>
-            <a:ext cx="4052262" cy="1"/>
-          </a:xfrm>
-          <a:prstGeom prst="line">
-            <a:avLst/>
-          </a:prstGeom>
-        </p:spPr>
-        <p:style>
-          <a:lnRef idx="3">
-            <a:schemeClr val="accent6"/>
-          </a:lnRef>
-          <a:fillRef idx="0">
-            <a:schemeClr val="accent6"/>
-          </a:fillRef>
-          <a:effectRef idx="2">
-            <a:schemeClr val="accent6"/>
-          </a:effectRef>
-          <a:fontRef idx="minor">
-            <a:schemeClr val="tx1"/>
-          </a:fontRef>
-        </p:style>
-      </p:cxnSp>
-      <p:cxnSp>
-        <p:nvCxnSpPr>
-          <p:cNvPr id="40" name="Straight Connector 39">
-            <a:extLst>
-              <a:ext uri="{FF2B5EF4-FFF2-40B4-BE49-F238E27FC236}">
-                <a16:creationId xmlns:a16="http://schemas.microsoft.com/office/drawing/2014/main" id="{BDEE400A-0DE2-49B7-8F72-9DFBF7654F3C}"/>
-              </a:ext>
-            </a:extLst>
-          </p:cNvPr>
-          <p:cNvCxnSpPr>
-            <a:cxnSpLocks/>
-            <a:stCxn id="7" idx="3"/>
-            <a:endCxn id="6" idx="1"/>
-          </p:cNvCxnSpPr>
-          <p:nvPr/>
-        </p:nvCxnSpPr>
-        <p:spPr>
-          <a:xfrm flipV="1">
-            <a:off x="3943766" y="3721279"/>
-            <a:ext cx="1102206" cy="1"/>
-          </a:xfrm>
-          <a:prstGeom prst="line">
-            <a:avLst/>
-          </a:prstGeom>
-        </p:spPr>
-        <p:style>
-          <a:lnRef idx="3">
-            <a:schemeClr val="accent6"/>
-          </a:lnRef>
-          <a:fillRef idx="0">
-            <a:schemeClr val="accent6"/>
-          </a:fillRef>
-          <a:effectRef idx="2">
-            <a:schemeClr val="accent6"/>
-          </a:effectRef>
-          <a:fontRef idx="minor">
-            <a:schemeClr val="tx1"/>
-          </a:fontRef>
-        </p:style>
-      </p:cxnSp>
-      <p:cxnSp>
-        <p:nvCxnSpPr>
-          <p:cNvPr id="43" name="Straight Connector 42">
-            <a:extLst>
-              <a:ext uri="{FF2B5EF4-FFF2-40B4-BE49-F238E27FC236}">
-                <a16:creationId xmlns:a16="http://schemas.microsoft.com/office/drawing/2014/main" id="{8A398D92-ABAA-4F9C-AF68-263AA9B12862}"/>
-              </a:ext>
-            </a:extLst>
-          </p:cNvPr>
-          <p:cNvCxnSpPr>
-            <a:cxnSpLocks/>
-            <a:stCxn id="7" idx="0"/>
-            <a:endCxn id="8" idx="2"/>
-          </p:cNvCxnSpPr>
-          <p:nvPr/>
-        </p:nvCxnSpPr>
-        <p:spPr>
-          <a:xfrm flipV="1">
-            <a:off x="3019841" y="2394309"/>
-            <a:ext cx="0" cy="638173"/>
-          </a:xfrm>
-          <a:prstGeom prst="line">
-            <a:avLst/>
-          </a:prstGeom>
-        </p:spPr>
-        <p:style>
-          <a:lnRef idx="3">
-            <a:schemeClr val="accent6"/>
-          </a:lnRef>
-          <a:fillRef idx="0">
-            <a:schemeClr val="accent6"/>
-          </a:fillRef>
-          <a:effectRef idx="2">
-            <a:schemeClr val="accent6"/>
           </a:effectRef>
           <a:fontRef idx="minor">
             <a:schemeClr val="tx1"/>

</xml_diff>

<commit_message>
Part way through documenting perception.  Realised still had namespaces in.  Removed, but need to check other examples.  Also need to finish the Starling overview.
</commit_message>
<xml_diff>
--- a/tutorial/sketch.pptx
+++ b/tutorial/sketch.pptx
@@ -116,7 +116,7 @@
 <file path=ppt/revisionInfo.xml><?xml version="1.0" encoding="utf-8"?>
 <p1510:revInfo xmlns:a="http://schemas.openxmlformats.org/drawingml/2006/main" xmlns:r="http://schemas.openxmlformats.org/officeDocument/2006/relationships" xmlns:p1510="http://schemas.microsoft.com/office/powerpoint/2015/10/main">
   <p1510:revLst>
-    <p1510:client id="{9E6F36A3-E297-4DC3-A3EC-FF05A17655DE}" v="16" dt="2022-01-10T16:30:46.007"/>
+    <p1510:client id="{9E6F36A3-E297-4DC3-A3EC-FF05A17655DE}" v="37" dt="2022-01-11T10:56:43.898"/>
   </p1510:revLst>
 </p1510:revInfo>
 </file>
@@ -206,10 +206,289 @@
   <pc:docChgLst>
     <pc:chgData name="Arthur Richards" userId="9bbc7d88-dc76-4252-a227-954969c11068" providerId="ADAL" clId="{9E6F36A3-E297-4DC3-A3EC-FF05A17655DE}"/>
     <pc:docChg chg="undo custSel addSld modSld">
-      <pc:chgData name="Arthur Richards" userId="9bbc7d88-dc76-4252-a227-954969c11068" providerId="ADAL" clId="{9E6F36A3-E297-4DC3-A3EC-FF05A17655DE}" dt="2022-01-10T16:30:46.007" v="194" actId="571"/>
+      <pc:chgData name="Arthur Richards" userId="9bbc7d88-dc76-4252-a227-954969c11068" providerId="ADAL" clId="{9E6F36A3-E297-4DC3-A3EC-FF05A17655DE}" dt="2022-01-11T10:56:46.502" v="411" actId="20577"/>
       <pc:docMkLst>
         <pc:docMk/>
       </pc:docMkLst>
+      <pc:sldChg chg="addSp delSp modSp mod">
+        <pc:chgData name="Arthur Richards" userId="9bbc7d88-dc76-4252-a227-954969c11068" providerId="ADAL" clId="{9E6F36A3-E297-4DC3-A3EC-FF05A17655DE}" dt="2022-01-11T10:56:46.502" v="411" actId="20577"/>
+        <pc:sldMkLst>
+          <pc:docMk/>
+          <pc:sldMk cId="4272711254" sldId="256"/>
+        </pc:sldMkLst>
+        <pc:spChg chg="mod">
+          <ac:chgData name="Arthur Richards" userId="9bbc7d88-dc76-4252-a227-954969c11068" providerId="ADAL" clId="{9E6F36A3-E297-4DC3-A3EC-FF05A17655DE}" dt="2022-01-11T10:50:37.485" v="331" actId="1076"/>
+          <ac:spMkLst>
+            <pc:docMk/>
+            <pc:sldMk cId="4272711254" sldId="256"/>
+            <ac:spMk id="4" creationId="{EFC5819C-53BD-419B-8437-279F5D892082}"/>
+          </ac:spMkLst>
+        </pc:spChg>
+        <pc:spChg chg="mod">
+          <ac:chgData name="Arthur Richards" userId="9bbc7d88-dc76-4252-a227-954969c11068" providerId="ADAL" clId="{9E6F36A3-E297-4DC3-A3EC-FF05A17655DE}" dt="2022-01-11T10:50:37.485" v="331" actId="1076"/>
+          <ac:spMkLst>
+            <pc:docMk/>
+            <pc:sldMk cId="4272711254" sldId="256"/>
+            <ac:spMk id="5" creationId="{4FF9ECB1-F5C1-49EB-8143-4F4754FECBC4}"/>
+          </ac:spMkLst>
+        </pc:spChg>
+        <pc:spChg chg="mod">
+          <ac:chgData name="Arthur Richards" userId="9bbc7d88-dc76-4252-a227-954969c11068" providerId="ADAL" clId="{9E6F36A3-E297-4DC3-A3EC-FF05A17655DE}" dt="2022-01-11T10:50:37.485" v="331" actId="1076"/>
+          <ac:spMkLst>
+            <pc:docMk/>
+            <pc:sldMk cId="4272711254" sldId="256"/>
+            <ac:spMk id="6" creationId="{E0AF46E2-28A2-41F1-A252-7BD226F12B6F}"/>
+          </ac:spMkLst>
+        </pc:spChg>
+        <pc:spChg chg="mod">
+          <ac:chgData name="Arthur Richards" userId="9bbc7d88-dc76-4252-a227-954969c11068" providerId="ADAL" clId="{9E6F36A3-E297-4DC3-A3EC-FF05A17655DE}" dt="2022-01-11T10:50:37.485" v="331" actId="1076"/>
+          <ac:spMkLst>
+            <pc:docMk/>
+            <pc:sldMk cId="4272711254" sldId="256"/>
+            <ac:spMk id="7" creationId="{678365ED-44B9-45A0-89FC-4E93A977AF1B}"/>
+          </ac:spMkLst>
+        </pc:spChg>
+        <pc:spChg chg="mod">
+          <ac:chgData name="Arthur Richards" userId="9bbc7d88-dc76-4252-a227-954969c11068" providerId="ADAL" clId="{9E6F36A3-E297-4DC3-A3EC-FF05A17655DE}" dt="2022-01-11T10:50:37.485" v="331" actId="1076"/>
+          <ac:spMkLst>
+            <pc:docMk/>
+            <pc:sldMk cId="4272711254" sldId="256"/>
+            <ac:spMk id="8" creationId="{7A7830B0-F4FA-4917-B89F-485DB233C8A6}"/>
+          </ac:spMkLst>
+        </pc:spChg>
+        <pc:spChg chg="mod">
+          <ac:chgData name="Arthur Richards" userId="9bbc7d88-dc76-4252-a227-954969c11068" providerId="ADAL" clId="{9E6F36A3-E297-4DC3-A3EC-FF05A17655DE}" dt="2022-01-11T10:50:37.485" v="331" actId="1076"/>
+          <ac:spMkLst>
+            <pc:docMk/>
+            <pc:sldMk cId="4272711254" sldId="256"/>
+            <ac:spMk id="12" creationId="{EC64BE61-DA9C-45F5-80B6-C574DB9692F3}"/>
+          </ac:spMkLst>
+        </pc:spChg>
+        <pc:spChg chg="add mod">
+          <ac:chgData name="Arthur Richards" userId="9bbc7d88-dc76-4252-a227-954969c11068" providerId="ADAL" clId="{9E6F36A3-E297-4DC3-A3EC-FF05A17655DE}" dt="2022-01-11T10:50:37.485" v="331" actId="1076"/>
+          <ac:spMkLst>
+            <pc:docMk/>
+            <pc:sldMk cId="4272711254" sldId="256"/>
+            <ac:spMk id="13" creationId="{E5EA8537-2C75-48D3-9B81-E62F905CBDE9}"/>
+          </ac:spMkLst>
+        </pc:spChg>
+        <pc:spChg chg="mod">
+          <ac:chgData name="Arthur Richards" userId="9bbc7d88-dc76-4252-a227-954969c11068" providerId="ADAL" clId="{9E6F36A3-E297-4DC3-A3EC-FF05A17655DE}" dt="2022-01-11T10:50:37.485" v="331" actId="1076"/>
+          <ac:spMkLst>
+            <pc:docMk/>
+            <pc:sldMk cId="4272711254" sldId="256"/>
+            <ac:spMk id="16" creationId="{18733315-481B-47D6-9141-9389C95500FF}"/>
+          </ac:spMkLst>
+        </pc:spChg>
+        <pc:spChg chg="add mod ord">
+          <ac:chgData name="Arthur Richards" userId="9bbc7d88-dc76-4252-a227-954969c11068" providerId="ADAL" clId="{9E6F36A3-E297-4DC3-A3EC-FF05A17655DE}" dt="2022-01-11T10:50:37.485" v="331" actId="1076"/>
+          <ac:spMkLst>
+            <pc:docMk/>
+            <pc:sldMk cId="4272711254" sldId="256"/>
+            <ac:spMk id="29" creationId="{BE67E804-7429-457A-91D9-D32E0EFDB1E5}"/>
+          </ac:spMkLst>
+        </pc:spChg>
+        <pc:spChg chg="add mod">
+          <ac:chgData name="Arthur Richards" userId="9bbc7d88-dc76-4252-a227-954969c11068" providerId="ADAL" clId="{9E6F36A3-E297-4DC3-A3EC-FF05A17655DE}" dt="2022-01-11T10:50:37.485" v="331" actId="1076"/>
+          <ac:spMkLst>
+            <pc:docMk/>
+            <pc:sldMk cId="4272711254" sldId="256"/>
+            <ac:spMk id="30" creationId="{7D3EEBE1-653C-4211-9936-8F365ED8DDE7}"/>
+          </ac:spMkLst>
+        </pc:spChg>
+        <pc:spChg chg="add mod ord">
+          <ac:chgData name="Arthur Richards" userId="9bbc7d88-dc76-4252-a227-954969c11068" providerId="ADAL" clId="{9E6F36A3-E297-4DC3-A3EC-FF05A17655DE}" dt="2022-01-11T10:50:37.485" v="331" actId="1076"/>
+          <ac:spMkLst>
+            <pc:docMk/>
+            <pc:sldMk cId="4272711254" sldId="256"/>
+            <ac:spMk id="32" creationId="{6F71E743-CA6B-4AC3-963D-9137E48D968F}"/>
+          </ac:spMkLst>
+        </pc:spChg>
+        <pc:spChg chg="add mod ord">
+          <ac:chgData name="Arthur Richards" userId="9bbc7d88-dc76-4252-a227-954969c11068" providerId="ADAL" clId="{9E6F36A3-E297-4DC3-A3EC-FF05A17655DE}" dt="2022-01-11T10:50:37.485" v="331" actId="1076"/>
+          <ac:spMkLst>
+            <pc:docMk/>
+            <pc:sldMk cId="4272711254" sldId="256"/>
+            <ac:spMk id="33" creationId="{B7160021-E7D3-4F0A-8631-C01CDEFCE4A9}"/>
+          </ac:spMkLst>
+        </pc:spChg>
+        <pc:spChg chg="add mod ord">
+          <ac:chgData name="Arthur Richards" userId="9bbc7d88-dc76-4252-a227-954969c11068" providerId="ADAL" clId="{9E6F36A3-E297-4DC3-A3EC-FF05A17655DE}" dt="2022-01-11T10:50:37.485" v="331" actId="1076"/>
+          <ac:spMkLst>
+            <pc:docMk/>
+            <pc:sldMk cId="4272711254" sldId="256"/>
+            <ac:spMk id="34" creationId="{5A73D32C-4F6A-45F6-BE2E-72553A3896EA}"/>
+          </ac:spMkLst>
+        </pc:spChg>
+        <pc:spChg chg="add mod ord">
+          <ac:chgData name="Arthur Richards" userId="9bbc7d88-dc76-4252-a227-954969c11068" providerId="ADAL" clId="{9E6F36A3-E297-4DC3-A3EC-FF05A17655DE}" dt="2022-01-11T10:50:37.485" v="331" actId="1076"/>
+          <ac:spMkLst>
+            <pc:docMk/>
+            <pc:sldMk cId="4272711254" sldId="256"/>
+            <ac:spMk id="35" creationId="{E1FDE5DF-D7E5-4FA3-AE42-4D81F499DB03}"/>
+          </ac:spMkLst>
+        </pc:spChg>
+        <pc:spChg chg="add mod ord">
+          <ac:chgData name="Arthur Richards" userId="9bbc7d88-dc76-4252-a227-954969c11068" providerId="ADAL" clId="{9E6F36A3-E297-4DC3-A3EC-FF05A17655DE}" dt="2022-01-11T10:50:37.485" v="331" actId="1076"/>
+          <ac:spMkLst>
+            <pc:docMk/>
+            <pc:sldMk cId="4272711254" sldId="256"/>
+            <ac:spMk id="43" creationId="{3619A4BF-1243-42E1-9065-D7561BA84D51}"/>
+          </ac:spMkLst>
+        </pc:spChg>
+        <pc:spChg chg="add mod">
+          <ac:chgData name="Arthur Richards" userId="9bbc7d88-dc76-4252-a227-954969c11068" providerId="ADAL" clId="{9E6F36A3-E297-4DC3-A3EC-FF05A17655DE}" dt="2022-01-11T10:53:36.587" v="382" actId="207"/>
+          <ac:spMkLst>
+            <pc:docMk/>
+            <pc:sldMk cId="4272711254" sldId="256"/>
+            <ac:spMk id="44" creationId="{07086C1C-2B50-437A-9FA2-CB0E57020287}"/>
+          </ac:spMkLst>
+        </pc:spChg>
+        <pc:spChg chg="add mod">
+          <ac:chgData name="Arthur Richards" userId="9bbc7d88-dc76-4252-a227-954969c11068" providerId="ADAL" clId="{9E6F36A3-E297-4DC3-A3EC-FF05A17655DE}" dt="2022-01-11T10:53:36.587" v="382" actId="207"/>
+          <ac:spMkLst>
+            <pc:docMk/>
+            <pc:sldMk cId="4272711254" sldId="256"/>
+            <ac:spMk id="45" creationId="{A43B6B08-BFC9-47F3-81C8-81C7E2F54812}"/>
+          </ac:spMkLst>
+        </pc:spChg>
+        <pc:spChg chg="add mod">
+          <ac:chgData name="Arthur Richards" userId="9bbc7d88-dc76-4252-a227-954969c11068" providerId="ADAL" clId="{9E6F36A3-E297-4DC3-A3EC-FF05A17655DE}" dt="2022-01-11T10:53:36.587" v="382" actId="207"/>
+          <ac:spMkLst>
+            <pc:docMk/>
+            <pc:sldMk cId="4272711254" sldId="256"/>
+            <ac:spMk id="46" creationId="{67C12D2E-0F9B-4561-8A55-4987C11C96DF}"/>
+          </ac:spMkLst>
+        </pc:spChg>
+        <pc:spChg chg="add mod">
+          <ac:chgData name="Arthur Richards" userId="9bbc7d88-dc76-4252-a227-954969c11068" providerId="ADAL" clId="{9E6F36A3-E297-4DC3-A3EC-FF05A17655DE}" dt="2022-01-11T10:56:27.744" v="401" actId="1076"/>
+          <ac:spMkLst>
+            <pc:docMk/>
+            <pc:sldMk cId="4272711254" sldId="256"/>
+            <ac:spMk id="51" creationId="{FC430237-44AF-403D-9864-ED24ED50DF23}"/>
+          </ac:spMkLst>
+        </pc:spChg>
+        <pc:spChg chg="add del mod">
+          <ac:chgData name="Arthur Richards" userId="9bbc7d88-dc76-4252-a227-954969c11068" providerId="ADAL" clId="{9E6F36A3-E297-4DC3-A3EC-FF05A17655DE}" dt="2022-01-11T10:56:14.605" v="400" actId="478"/>
+          <ac:spMkLst>
+            <pc:docMk/>
+            <pc:sldMk cId="4272711254" sldId="256"/>
+            <ac:spMk id="52" creationId="{E12AD4A5-4D3B-4333-B1E6-75F214AFE004}"/>
+          </ac:spMkLst>
+        </pc:spChg>
+        <pc:spChg chg="add mod">
+          <ac:chgData name="Arthur Richards" userId="9bbc7d88-dc76-4252-a227-954969c11068" providerId="ADAL" clId="{9E6F36A3-E297-4DC3-A3EC-FF05A17655DE}" dt="2022-01-11T10:56:36.794" v="406" actId="20577"/>
+          <ac:spMkLst>
+            <pc:docMk/>
+            <pc:sldMk cId="4272711254" sldId="256"/>
+            <ac:spMk id="53" creationId="{CEE2B5D6-7893-4341-B3EF-84B3EBCCC36A}"/>
+          </ac:spMkLst>
+        </pc:spChg>
+        <pc:spChg chg="add mod">
+          <ac:chgData name="Arthur Richards" userId="9bbc7d88-dc76-4252-a227-954969c11068" providerId="ADAL" clId="{9E6F36A3-E297-4DC3-A3EC-FF05A17655DE}" dt="2022-01-11T10:56:46.502" v="411" actId="20577"/>
+          <ac:spMkLst>
+            <pc:docMk/>
+            <pc:sldMk cId="4272711254" sldId="256"/>
+            <ac:spMk id="54" creationId="{FDF4809F-863E-4D3C-B892-743CA6989B8F}"/>
+          </ac:spMkLst>
+        </pc:spChg>
+        <pc:cxnChg chg="add del mod">
+          <ac:chgData name="Arthur Richards" userId="9bbc7d88-dc76-4252-a227-954969c11068" providerId="ADAL" clId="{9E6F36A3-E297-4DC3-A3EC-FF05A17655DE}" dt="2022-01-11T10:39:21.167" v="225" actId="478"/>
+          <ac:cxnSpMkLst>
+            <pc:docMk/>
+            <pc:sldMk cId="4272711254" sldId="256"/>
+            <ac:cxnSpMk id="9" creationId="{BB618BBE-2B1E-49A1-A251-E5A82B6625D5}"/>
+          </ac:cxnSpMkLst>
+        </pc:cxnChg>
+        <pc:cxnChg chg="mod">
+          <ac:chgData name="Arthur Richards" userId="9bbc7d88-dc76-4252-a227-954969c11068" providerId="ADAL" clId="{9E6F36A3-E297-4DC3-A3EC-FF05A17655DE}" dt="2022-01-11T10:50:37.485" v="331" actId="1076"/>
+          <ac:cxnSpMkLst>
+            <pc:docMk/>
+            <pc:sldMk cId="4272711254" sldId="256"/>
+            <ac:cxnSpMk id="11" creationId="{80F490A8-C42B-4934-9BF2-4ECB3CC58786}"/>
+          </ac:cxnSpMkLst>
+        </pc:cxnChg>
+        <pc:cxnChg chg="add mod">
+          <ac:chgData name="Arthur Richards" userId="9bbc7d88-dc76-4252-a227-954969c11068" providerId="ADAL" clId="{9E6F36A3-E297-4DC3-A3EC-FF05A17655DE}" dt="2022-01-11T10:50:37.485" v="331" actId="1076"/>
+          <ac:cxnSpMkLst>
+            <pc:docMk/>
+            <pc:sldMk cId="4272711254" sldId="256"/>
+            <ac:cxnSpMk id="19" creationId="{9E45FA31-6C53-43C4-8B0F-7E3A4DF93522}"/>
+          </ac:cxnSpMkLst>
+        </pc:cxnChg>
+        <pc:cxnChg chg="add mod">
+          <ac:chgData name="Arthur Richards" userId="9bbc7d88-dc76-4252-a227-954969c11068" providerId="ADAL" clId="{9E6F36A3-E297-4DC3-A3EC-FF05A17655DE}" dt="2022-01-11T10:50:37.485" v="331" actId="1076"/>
+          <ac:cxnSpMkLst>
+            <pc:docMk/>
+            <pc:sldMk cId="4272711254" sldId="256"/>
+            <ac:cxnSpMk id="22" creationId="{6CE1ED56-F664-482F-909B-0AA5AEDE1B9C}"/>
+          </ac:cxnSpMkLst>
+        </pc:cxnChg>
+        <pc:cxnChg chg="add mod">
+          <ac:chgData name="Arthur Richards" userId="9bbc7d88-dc76-4252-a227-954969c11068" providerId="ADAL" clId="{9E6F36A3-E297-4DC3-A3EC-FF05A17655DE}" dt="2022-01-11T10:50:37.485" v="331" actId="1076"/>
+          <ac:cxnSpMkLst>
+            <pc:docMk/>
+            <pc:sldMk cId="4272711254" sldId="256"/>
+            <ac:cxnSpMk id="24" creationId="{A67F0976-2817-4863-9F47-C666758C1455}"/>
+          </ac:cxnSpMkLst>
+        </pc:cxnChg>
+        <pc:cxnChg chg="add mod">
+          <ac:chgData name="Arthur Richards" userId="9bbc7d88-dc76-4252-a227-954969c11068" providerId="ADAL" clId="{9E6F36A3-E297-4DC3-A3EC-FF05A17655DE}" dt="2022-01-11T10:50:37.485" v="331" actId="1076"/>
+          <ac:cxnSpMkLst>
+            <pc:docMk/>
+            <pc:sldMk cId="4272711254" sldId="256"/>
+            <ac:cxnSpMk id="26" creationId="{6BE4D7AC-2E88-47C5-B17B-982EEEF13416}"/>
+          </ac:cxnSpMkLst>
+        </pc:cxnChg>
+        <pc:cxnChg chg="add mod">
+          <ac:chgData name="Arthur Richards" userId="9bbc7d88-dc76-4252-a227-954969c11068" providerId="ADAL" clId="{9E6F36A3-E297-4DC3-A3EC-FF05A17655DE}" dt="2022-01-11T10:50:37.485" v="331" actId="1076"/>
+          <ac:cxnSpMkLst>
+            <pc:docMk/>
+            <pc:sldMk cId="4272711254" sldId="256"/>
+            <ac:cxnSpMk id="27" creationId="{8CEF7035-DA90-427A-92DF-FA61B55053A8}"/>
+          </ac:cxnSpMkLst>
+        </pc:cxnChg>
+        <pc:cxnChg chg="add mod ord">
+          <ac:chgData name="Arthur Richards" userId="9bbc7d88-dc76-4252-a227-954969c11068" providerId="ADAL" clId="{9E6F36A3-E297-4DC3-A3EC-FF05A17655DE}" dt="2022-01-11T10:50:37.485" v="331" actId="1076"/>
+          <ac:cxnSpMkLst>
+            <pc:docMk/>
+            <pc:sldMk cId="4272711254" sldId="256"/>
+            <ac:cxnSpMk id="28" creationId="{D8FE3924-A85E-4B58-A437-C37D635D0423}"/>
+          </ac:cxnSpMkLst>
+        </pc:cxnChg>
+        <pc:cxnChg chg="mod">
+          <ac:chgData name="Arthur Richards" userId="9bbc7d88-dc76-4252-a227-954969c11068" providerId="ADAL" clId="{9E6F36A3-E297-4DC3-A3EC-FF05A17655DE}" dt="2022-01-11T10:50:37.485" v="331" actId="1076"/>
+          <ac:cxnSpMkLst>
+            <pc:docMk/>
+            <pc:sldMk cId="4272711254" sldId="256"/>
+            <ac:cxnSpMk id="31" creationId="{1E7137F6-AD11-4E9C-BB79-0B8CB84356B7}"/>
+          </ac:cxnSpMkLst>
+        </pc:cxnChg>
+        <pc:cxnChg chg="add mod">
+          <ac:chgData name="Arthur Richards" userId="9bbc7d88-dc76-4252-a227-954969c11068" providerId="ADAL" clId="{9E6F36A3-E297-4DC3-A3EC-FF05A17655DE}" dt="2022-01-11T10:53:01.740" v="378"/>
+          <ac:cxnSpMkLst>
+            <pc:docMk/>
+            <pc:sldMk cId="4272711254" sldId="256"/>
+            <ac:cxnSpMk id="48" creationId="{C1CC229C-0FC7-41C2-AFF3-71033AC634F6}"/>
+          </ac:cxnSpMkLst>
+        </pc:cxnChg>
+        <pc:cxnChg chg="add mod">
+          <ac:chgData name="Arthur Richards" userId="9bbc7d88-dc76-4252-a227-954969c11068" providerId="ADAL" clId="{9E6F36A3-E297-4DC3-A3EC-FF05A17655DE}" dt="2022-01-11T10:53:17.386" v="380" actId="1076"/>
+          <ac:cxnSpMkLst>
+            <pc:docMk/>
+            <pc:sldMk cId="4272711254" sldId="256"/>
+            <ac:cxnSpMk id="49" creationId="{A87F7706-A99D-41B2-84C6-35E3FD918EEA}"/>
+          </ac:cxnSpMkLst>
+        </pc:cxnChg>
+        <pc:cxnChg chg="add mod">
+          <ac:chgData name="Arthur Richards" userId="9bbc7d88-dc76-4252-a227-954969c11068" providerId="ADAL" clId="{9E6F36A3-E297-4DC3-A3EC-FF05A17655DE}" dt="2022-01-11T10:53:21.563" v="381" actId="571"/>
+          <ac:cxnSpMkLst>
+            <pc:docMk/>
+            <pc:sldMk cId="4272711254" sldId="256"/>
+            <ac:cxnSpMk id="50" creationId="{49C3C5CC-0769-4910-9A61-6BFDAFD55A5E}"/>
+          </ac:cxnSpMkLst>
+        </pc:cxnChg>
+      </pc:sldChg>
       <pc:sldChg chg="addSp delSp modSp new mod">
         <pc:chgData name="Arthur Richards" userId="9bbc7d88-dc76-4252-a227-954969c11068" providerId="ADAL" clId="{9E6F36A3-E297-4DC3-A3EC-FF05A17655DE}" dt="2022-01-10T16:30:46.007" v="194" actId="571"/>
         <pc:sldMkLst>
@@ -603,7 +882,7 @@
           <a:p>
             <a:fld id="{FC20C6D0-2F14-4B19-A692-CABB66D824D4}" type="datetimeFigureOut">
               <a:rPr lang="en-GB" smtClean="0"/>
-              <a:t>10/01/2022</a:t>
+              <a:t>11/01/2022</a:t>
             </a:fld>
             <a:endParaRPr lang="en-GB"/>
           </a:p>
@@ -803,7 +1082,7 @@
           <a:p>
             <a:fld id="{FC20C6D0-2F14-4B19-A692-CABB66D824D4}" type="datetimeFigureOut">
               <a:rPr lang="en-GB" smtClean="0"/>
-              <a:t>10/01/2022</a:t>
+              <a:t>11/01/2022</a:t>
             </a:fld>
             <a:endParaRPr lang="en-GB"/>
           </a:p>
@@ -1013,7 +1292,7 @@
           <a:p>
             <a:fld id="{FC20C6D0-2F14-4B19-A692-CABB66D824D4}" type="datetimeFigureOut">
               <a:rPr lang="en-GB" smtClean="0"/>
-              <a:t>10/01/2022</a:t>
+              <a:t>11/01/2022</a:t>
             </a:fld>
             <a:endParaRPr lang="en-GB"/>
           </a:p>
@@ -1213,7 +1492,7 @@
           <a:p>
             <a:fld id="{FC20C6D0-2F14-4B19-A692-CABB66D824D4}" type="datetimeFigureOut">
               <a:rPr lang="en-GB" smtClean="0"/>
-              <a:t>10/01/2022</a:t>
+              <a:t>11/01/2022</a:t>
             </a:fld>
             <a:endParaRPr lang="en-GB"/>
           </a:p>
@@ -1489,7 +1768,7 @@
           <a:p>
             <a:fld id="{FC20C6D0-2F14-4B19-A692-CABB66D824D4}" type="datetimeFigureOut">
               <a:rPr lang="en-GB" smtClean="0"/>
-              <a:t>10/01/2022</a:t>
+              <a:t>11/01/2022</a:t>
             </a:fld>
             <a:endParaRPr lang="en-GB"/>
           </a:p>
@@ -1757,7 +2036,7 @@
           <a:p>
             <a:fld id="{FC20C6D0-2F14-4B19-A692-CABB66D824D4}" type="datetimeFigureOut">
               <a:rPr lang="en-GB" smtClean="0"/>
-              <a:t>10/01/2022</a:t>
+              <a:t>11/01/2022</a:t>
             </a:fld>
             <a:endParaRPr lang="en-GB"/>
           </a:p>
@@ -2172,7 +2451,7 @@
           <a:p>
             <a:fld id="{FC20C6D0-2F14-4B19-A692-CABB66D824D4}" type="datetimeFigureOut">
               <a:rPr lang="en-GB" smtClean="0"/>
-              <a:t>10/01/2022</a:t>
+              <a:t>11/01/2022</a:t>
             </a:fld>
             <a:endParaRPr lang="en-GB"/>
           </a:p>
@@ -2314,7 +2593,7 @@
           <a:p>
             <a:fld id="{FC20C6D0-2F14-4B19-A692-CABB66D824D4}" type="datetimeFigureOut">
               <a:rPr lang="en-GB" smtClean="0"/>
-              <a:t>10/01/2022</a:t>
+              <a:t>11/01/2022</a:t>
             </a:fld>
             <a:endParaRPr lang="en-GB"/>
           </a:p>
@@ -2427,7 +2706,7 @@
           <a:p>
             <a:fld id="{FC20C6D0-2F14-4B19-A692-CABB66D824D4}" type="datetimeFigureOut">
               <a:rPr lang="en-GB" smtClean="0"/>
-              <a:t>10/01/2022</a:t>
+              <a:t>11/01/2022</a:t>
             </a:fld>
             <a:endParaRPr lang="en-GB"/>
           </a:p>
@@ -2740,7 +3019,7 @@
           <a:p>
             <a:fld id="{FC20C6D0-2F14-4B19-A692-CABB66D824D4}" type="datetimeFigureOut">
               <a:rPr lang="en-GB" smtClean="0"/>
-              <a:t>10/01/2022</a:t>
+              <a:t>11/01/2022</a:t>
             </a:fld>
             <a:endParaRPr lang="en-GB"/>
           </a:p>
@@ -3029,7 +3308,7 @@
           <a:p>
             <a:fld id="{FC20C6D0-2F14-4B19-A692-CABB66D824D4}" type="datetimeFigureOut">
               <a:rPr lang="en-GB" smtClean="0"/>
-              <a:t>10/01/2022</a:t>
+              <a:t>11/01/2022</a:t>
             </a:fld>
             <a:endParaRPr lang="en-GB"/>
           </a:p>
@@ -3272,7 +3551,7 @@
           <a:p>
             <a:fld id="{FC20C6D0-2F14-4B19-A692-CABB66D824D4}" type="datetimeFigureOut">
               <a:rPr lang="en-GB" smtClean="0"/>
-              <a:t>10/01/2022</a:t>
+              <a:t>11/01/2022</a:t>
             </a:fld>
             <a:endParaRPr lang="en-GB"/>
           </a:p>
@@ -3691,10 +3970,10 @@
       </p:grpSpPr>
       <p:sp>
         <p:nvSpPr>
-          <p:cNvPr id="4" name="Rectangle: Rounded Corners 3">
-            <a:extLst>
-              <a:ext uri="{FF2B5EF4-FFF2-40B4-BE49-F238E27FC236}">
-                <a16:creationId xmlns:a16="http://schemas.microsoft.com/office/drawing/2014/main" id="{EFC5819C-53BD-419B-8437-279F5D892082}"/>
+          <p:cNvPr id="43" name="Rectangle: Rounded Corners 42">
+            <a:extLst>
+              <a:ext uri="{FF2B5EF4-FFF2-40B4-BE49-F238E27FC236}">
+                <a16:creationId xmlns:a16="http://schemas.microsoft.com/office/drawing/2014/main" id="{3619A4BF-1243-42E1-9065-D7561BA84D51}"/>
               </a:ext>
             </a:extLst>
           </p:cNvPr>
@@ -3703,12 +3982,20 @@
         </p:nvSpPr>
         <p:spPr>
           <a:xfrm>
-            <a:off x="10946084" y="3032482"/>
-            <a:ext cx="1847850" cy="1377595"/>
+            <a:off x="-1485900" y="1328326"/>
+            <a:ext cx="15163800" cy="5054231"/>
           </a:xfrm>
           <a:prstGeom prst="roundRect">
-            <a:avLst/>
+            <a:avLst>
+              <a:gd name="adj" fmla="val 10478"/>
+            </a:avLst>
           </a:prstGeom>
+          <a:solidFill>
+            <a:schemeClr val="accent1">
+              <a:lumMod val="40000"/>
+              <a:lumOff val="60000"/>
+            </a:schemeClr>
+          </a:solidFill>
         </p:spPr>
         <p:style>
           <a:lnRef idx="2">
@@ -3727,34 +4014,26 @@
           </a:fontRef>
         </p:style>
         <p:txBody>
-          <a:bodyPr rtlCol="0" anchor="ctr"/>
-          <a:lstStyle/>
-          <a:p>
-            <a:pPr algn="ctr"/>
-            <a:r>
-              <a:rPr lang="en-GB" dirty="0"/>
-              <a:t>Gazebo</a:t>
-            </a:r>
-          </a:p>
-          <a:p>
-            <a:pPr algn="ctr"/>
-            <a:endParaRPr lang="en-GB" i="1" dirty="0"/>
-          </a:p>
-          <a:p>
-            <a:pPr algn="ctr"/>
-            <a:r>
-              <a:rPr lang="en-GB" i="1" dirty="0"/>
-              <a:t>Simulator</a:t>
-            </a:r>
-          </a:p>
-        </p:txBody>
-      </p:sp>
-      <p:sp>
-        <p:nvSpPr>
-          <p:cNvPr id="5" name="Rectangle: Rounded Corners 4">
-            <a:extLst>
-              <a:ext uri="{FF2B5EF4-FFF2-40B4-BE49-F238E27FC236}">
-                <a16:creationId xmlns:a16="http://schemas.microsoft.com/office/drawing/2014/main" id="{4FF9ECB1-F5C1-49EB-8143-4F4754FECBC4}"/>
+          <a:bodyPr rtlCol="0" anchor="b"/>
+          <a:lstStyle/>
+          <a:p>
+            <a:r>
+              <a:rPr lang="en-GB" dirty="0">
+                <a:solidFill>
+                  <a:schemeClr val="tx1"/>
+                </a:solidFill>
+              </a:rPr>
+              <a:t>Docker application</a:t>
+            </a:r>
+          </a:p>
+        </p:txBody>
+      </p:sp>
+      <p:sp>
+        <p:nvSpPr>
+          <p:cNvPr id="32" name="Rectangle: Rounded Corners 31">
+            <a:extLst>
+              <a:ext uri="{FF2B5EF4-FFF2-40B4-BE49-F238E27FC236}">
+                <a16:creationId xmlns:a16="http://schemas.microsoft.com/office/drawing/2014/main" id="{6F71E743-CA6B-4AC3-963D-9137E48D968F}"/>
               </a:ext>
             </a:extLst>
           </p:cNvPr>
@@ -3763,12 +4042,19 @@
         </p:nvSpPr>
         <p:spPr>
           <a:xfrm>
-            <a:off x="7996028" y="3032483"/>
-            <a:ext cx="1847850" cy="1377594"/>
+            <a:off x="1887550" y="1699261"/>
+            <a:ext cx="2537371" cy="4042940"/>
           </a:xfrm>
           <a:prstGeom prst="roundRect">
-            <a:avLst/>
+            <a:avLst>
+              <a:gd name="adj" fmla="val 9910"/>
+            </a:avLst>
           </a:prstGeom>
+          <a:solidFill>
+            <a:schemeClr val="bg1">
+              <a:lumMod val="85000"/>
+            </a:schemeClr>
+          </a:solidFill>
         </p:spPr>
         <p:style>
           <a:lnRef idx="2">
@@ -3787,35 +4073,26 @@
           </a:fontRef>
         </p:style>
         <p:txBody>
-          <a:bodyPr rtlCol="0" anchor="ctr"/>
-          <a:lstStyle/>
-          <a:p>
-            <a:pPr algn="ctr"/>
-            <a:r>
-              <a:rPr lang="en-GB" dirty="0" err="1"/>
-              <a:t>Ardupilot</a:t>
-            </a:r>
-            <a:endParaRPr lang="en-GB" dirty="0"/>
-          </a:p>
-          <a:p>
-            <a:pPr algn="ctr"/>
-            <a:endParaRPr lang="en-GB" dirty="0"/>
-          </a:p>
-          <a:p>
-            <a:pPr algn="ctr"/>
-            <a:r>
-              <a:rPr lang="en-GB" i="1" dirty="0"/>
-              <a:t>Autopilot</a:t>
-            </a:r>
-          </a:p>
-        </p:txBody>
-      </p:sp>
-      <p:sp>
-        <p:nvSpPr>
-          <p:cNvPr id="6" name="Rectangle: Rounded Corners 5">
-            <a:extLst>
-              <a:ext uri="{FF2B5EF4-FFF2-40B4-BE49-F238E27FC236}">
-                <a16:creationId xmlns:a16="http://schemas.microsoft.com/office/drawing/2014/main" id="{E0AF46E2-28A2-41F1-A252-7BD226F12B6F}"/>
+          <a:bodyPr rtlCol="0" anchor="t" anchorCtr="0"/>
+          <a:lstStyle/>
+          <a:p>
+            <a:r>
+              <a:rPr lang="en-GB" i="1" dirty="0">
+                <a:solidFill>
+                  <a:schemeClr val="tx1"/>
+                </a:solidFill>
+              </a:rPr>
+              <a:t>Container</a:t>
+            </a:r>
+          </a:p>
+        </p:txBody>
+      </p:sp>
+      <p:sp>
+        <p:nvSpPr>
+          <p:cNvPr id="33" name="Rectangle: Rounded Corners 32">
+            <a:extLst>
+              <a:ext uri="{FF2B5EF4-FFF2-40B4-BE49-F238E27FC236}">
+                <a16:creationId xmlns:a16="http://schemas.microsoft.com/office/drawing/2014/main" id="{B7160021-E7D3-4F0A-8631-C01CDEFCE4A9}"/>
               </a:ext>
             </a:extLst>
           </p:cNvPr>
@@ -3824,12 +4101,19 @@
         </p:nvSpPr>
         <p:spPr>
           <a:xfrm>
-            <a:off x="5045972" y="3032482"/>
-            <a:ext cx="1847850" cy="1377594"/>
+            <a:off x="4851035" y="1699261"/>
+            <a:ext cx="2537371" cy="4042940"/>
           </a:xfrm>
           <a:prstGeom prst="roundRect">
-            <a:avLst/>
+            <a:avLst>
+              <a:gd name="adj" fmla="val 9910"/>
+            </a:avLst>
           </a:prstGeom>
+          <a:solidFill>
+            <a:schemeClr val="bg1">
+              <a:lumMod val="85000"/>
+            </a:schemeClr>
+          </a:solidFill>
         </p:spPr>
         <p:style>
           <a:lnRef idx="2">
@@ -3848,34 +4132,26 @@
           </a:fontRef>
         </p:style>
         <p:txBody>
-          <a:bodyPr rtlCol="0" anchor="ctr"/>
-          <a:lstStyle/>
-          <a:p>
-            <a:pPr algn="ctr"/>
-            <a:r>
-              <a:rPr lang="en-GB" dirty="0"/>
-              <a:t>MAVROS</a:t>
-            </a:r>
-          </a:p>
-          <a:p>
-            <a:pPr algn="ctr"/>
-            <a:endParaRPr lang="en-GB" dirty="0"/>
-          </a:p>
-          <a:p>
-            <a:pPr algn="ctr"/>
-            <a:r>
-              <a:rPr lang="en-GB" i="1" dirty="0"/>
-              <a:t>Converter</a:t>
-            </a:r>
-          </a:p>
-        </p:txBody>
-      </p:sp>
-      <p:sp>
-        <p:nvSpPr>
-          <p:cNvPr id="7" name="Rectangle: Rounded Corners 6">
-            <a:extLst>
-              <a:ext uri="{FF2B5EF4-FFF2-40B4-BE49-F238E27FC236}">
-                <a16:creationId xmlns:a16="http://schemas.microsoft.com/office/drawing/2014/main" id="{678365ED-44B9-45A0-89FC-4E93A977AF1B}"/>
+          <a:bodyPr rtlCol="0" anchor="t" anchorCtr="0"/>
+          <a:lstStyle/>
+          <a:p>
+            <a:r>
+              <a:rPr lang="en-GB" i="1" dirty="0">
+                <a:solidFill>
+                  <a:schemeClr val="tx1"/>
+                </a:solidFill>
+              </a:rPr>
+              <a:t>Container</a:t>
+            </a:r>
+          </a:p>
+        </p:txBody>
+      </p:sp>
+      <p:sp>
+        <p:nvSpPr>
+          <p:cNvPr id="34" name="Rectangle: Rounded Corners 33">
+            <a:extLst>
+              <a:ext uri="{FF2B5EF4-FFF2-40B4-BE49-F238E27FC236}">
+                <a16:creationId xmlns:a16="http://schemas.microsoft.com/office/drawing/2014/main" id="{5A73D32C-4F6A-45F6-BE2E-72553A3896EA}"/>
               </a:ext>
             </a:extLst>
           </p:cNvPr>
@@ -3884,14 +4160,18 @@
         </p:nvSpPr>
         <p:spPr>
           <a:xfrm>
-            <a:off x="2095916" y="3032482"/>
-            <a:ext cx="1847850" cy="1377595"/>
+            <a:off x="7796047" y="1699261"/>
+            <a:ext cx="2537371" cy="4042940"/>
           </a:xfrm>
           <a:prstGeom prst="roundRect">
-            <a:avLst/>
+            <a:avLst>
+              <a:gd name="adj" fmla="val 9910"/>
+            </a:avLst>
           </a:prstGeom>
           <a:solidFill>
-            <a:schemeClr val="accent2"/>
+            <a:schemeClr val="bg1">
+              <a:lumMod val="85000"/>
+            </a:schemeClr>
           </a:solidFill>
         </p:spPr>
         <p:style>
@@ -3911,34 +4191,26 @@
           </a:fontRef>
         </p:style>
         <p:txBody>
-          <a:bodyPr rtlCol="0" anchor="ctr"/>
-          <a:lstStyle/>
-          <a:p>
-            <a:pPr algn="ctr"/>
-            <a:r>
-              <a:rPr lang="en-GB" dirty="0"/>
-              <a:t>Your code</a:t>
-            </a:r>
-          </a:p>
-          <a:p>
-            <a:pPr algn="ctr"/>
-            <a:endParaRPr lang="en-GB" dirty="0"/>
-          </a:p>
-          <a:p>
-            <a:pPr algn="ctr"/>
-            <a:r>
-              <a:rPr lang="en-GB" i="1" dirty="0"/>
-              <a:t>Controller</a:t>
-            </a:r>
-          </a:p>
-        </p:txBody>
-      </p:sp>
-      <p:sp>
-        <p:nvSpPr>
-          <p:cNvPr id="8" name="Rectangle: Rounded Corners 7">
-            <a:extLst>
-              <a:ext uri="{FF2B5EF4-FFF2-40B4-BE49-F238E27FC236}">
-                <a16:creationId xmlns:a16="http://schemas.microsoft.com/office/drawing/2014/main" id="{7A7830B0-F4FA-4917-B89F-485DB233C8A6}"/>
+          <a:bodyPr rtlCol="0" anchor="t" anchorCtr="0"/>
+          <a:lstStyle/>
+          <a:p>
+            <a:r>
+              <a:rPr lang="en-GB" i="1">
+                <a:solidFill>
+                  <a:schemeClr val="tx1"/>
+                </a:solidFill>
+              </a:rPr>
+              <a:t>Container</a:t>
+            </a:r>
+          </a:p>
+        </p:txBody>
+      </p:sp>
+      <p:sp>
+        <p:nvSpPr>
+          <p:cNvPr id="35" name="Rectangle: Rounded Corners 34">
+            <a:extLst>
+              <a:ext uri="{FF2B5EF4-FFF2-40B4-BE49-F238E27FC236}">
+                <a16:creationId xmlns:a16="http://schemas.microsoft.com/office/drawing/2014/main" id="{E1FDE5DF-D7E5-4FA3-AE42-4D81F499DB03}"/>
               </a:ext>
             </a:extLst>
           </p:cNvPr>
@@ -3947,14 +4219,18 @@
         </p:nvSpPr>
         <p:spPr>
           <a:xfrm>
-            <a:off x="-854140" y="3032482"/>
-            <a:ext cx="1847850" cy="1377594"/>
+            <a:off x="10741059" y="1699261"/>
+            <a:ext cx="2537371" cy="4042940"/>
           </a:xfrm>
           <a:prstGeom prst="roundRect">
-            <a:avLst/>
+            <a:avLst>
+              <a:gd name="adj" fmla="val 9910"/>
+            </a:avLst>
           </a:prstGeom>
           <a:solidFill>
-            <a:schemeClr val="accent2"/>
+            <a:schemeClr val="bg1">
+              <a:lumMod val="85000"/>
+            </a:schemeClr>
           </a:solidFill>
         </p:spPr>
         <p:style>
@@ -3974,6 +4250,407 @@
           </a:fontRef>
         </p:style>
         <p:txBody>
+          <a:bodyPr rtlCol="0" anchor="t" anchorCtr="0"/>
+          <a:lstStyle/>
+          <a:p>
+            <a:r>
+              <a:rPr lang="en-GB" i="1">
+                <a:solidFill>
+                  <a:schemeClr val="tx1"/>
+                </a:solidFill>
+              </a:rPr>
+              <a:t>Container</a:t>
+            </a:r>
+          </a:p>
+        </p:txBody>
+      </p:sp>
+      <p:sp>
+        <p:nvSpPr>
+          <p:cNvPr id="29" name="Rectangle: Rounded Corners 28">
+            <a:extLst>
+              <a:ext uri="{FF2B5EF4-FFF2-40B4-BE49-F238E27FC236}">
+                <a16:creationId xmlns:a16="http://schemas.microsoft.com/office/drawing/2014/main" id="{BE67E804-7429-457A-91D9-D32E0EFDB1E5}"/>
+              </a:ext>
+            </a:extLst>
+          </p:cNvPr>
+          <p:cNvSpPr/>
+          <p:nvPr/>
+        </p:nvSpPr>
+        <p:spPr>
+          <a:xfrm>
+            <a:off x="-1055259" y="1699261"/>
+            <a:ext cx="2537371" cy="4042940"/>
+          </a:xfrm>
+          <a:prstGeom prst="roundRect">
+            <a:avLst>
+              <a:gd name="adj" fmla="val 9910"/>
+            </a:avLst>
+          </a:prstGeom>
+          <a:solidFill>
+            <a:schemeClr val="bg1">
+              <a:lumMod val="85000"/>
+            </a:schemeClr>
+          </a:solidFill>
+        </p:spPr>
+        <p:style>
+          <a:lnRef idx="2">
+            <a:schemeClr val="accent1">
+              <a:shade val="50000"/>
+            </a:schemeClr>
+          </a:lnRef>
+          <a:fillRef idx="1">
+            <a:schemeClr val="accent1"/>
+          </a:fillRef>
+          <a:effectRef idx="0">
+            <a:schemeClr val="accent1"/>
+          </a:effectRef>
+          <a:fontRef idx="minor">
+            <a:schemeClr val="lt1"/>
+          </a:fontRef>
+        </p:style>
+        <p:txBody>
+          <a:bodyPr rtlCol="0" anchor="t" anchorCtr="0"/>
+          <a:lstStyle/>
+          <a:p>
+            <a:r>
+              <a:rPr lang="en-GB" i="1" dirty="0">
+                <a:solidFill>
+                  <a:schemeClr val="tx1"/>
+                </a:solidFill>
+              </a:rPr>
+              <a:t>Container</a:t>
+            </a:r>
+          </a:p>
+        </p:txBody>
+      </p:sp>
+      <p:cxnSp>
+        <p:nvCxnSpPr>
+          <p:cNvPr id="28" name="Straight Arrow Connector 27">
+            <a:extLst>
+              <a:ext uri="{FF2B5EF4-FFF2-40B4-BE49-F238E27FC236}">
+                <a16:creationId xmlns:a16="http://schemas.microsoft.com/office/drawing/2014/main" id="{D8FE3924-A85E-4B58-A437-C37D635D0423}"/>
+              </a:ext>
+            </a:extLst>
+          </p:cNvPr>
+          <p:cNvCxnSpPr>
+            <a:cxnSpLocks/>
+            <a:stCxn id="8" idx="2"/>
+          </p:cNvCxnSpPr>
+          <p:nvPr/>
+        </p:nvCxnSpPr>
+        <p:spPr>
+          <a:xfrm>
+            <a:off x="2969567" y="3600452"/>
+            <a:ext cx="0" cy="1894116"/>
+          </a:xfrm>
+          <a:prstGeom prst="straightConnector1">
+            <a:avLst/>
+          </a:prstGeom>
+          <a:ln>
+            <a:headEnd type="triangle" w="med" len="med"/>
+            <a:tailEnd type="triangle" w="med" len="med"/>
+          </a:ln>
+        </p:spPr>
+        <p:style>
+          <a:lnRef idx="3">
+            <a:schemeClr val="accent6"/>
+          </a:lnRef>
+          <a:fillRef idx="0">
+            <a:schemeClr val="accent6"/>
+          </a:fillRef>
+          <a:effectRef idx="2">
+            <a:schemeClr val="accent6"/>
+          </a:effectRef>
+          <a:fontRef idx="minor">
+            <a:schemeClr val="tx1"/>
+          </a:fontRef>
+        </p:style>
+      </p:cxnSp>
+      <p:sp>
+        <p:nvSpPr>
+          <p:cNvPr id="4" name="Rectangle: Rounded Corners 3">
+            <a:extLst>
+              <a:ext uri="{FF2B5EF4-FFF2-40B4-BE49-F238E27FC236}">
+                <a16:creationId xmlns:a16="http://schemas.microsoft.com/office/drawing/2014/main" id="{EFC5819C-53BD-419B-8437-279F5D892082}"/>
+              </a:ext>
+            </a:extLst>
+          </p:cNvPr>
+          <p:cNvSpPr/>
+          <p:nvPr/>
+        </p:nvSpPr>
+        <p:spPr>
+          <a:xfrm>
+            <a:off x="11090864" y="3855442"/>
+            <a:ext cx="1847850" cy="1377595"/>
+          </a:xfrm>
+          <a:prstGeom prst="roundRect">
+            <a:avLst/>
+          </a:prstGeom>
+        </p:spPr>
+        <p:style>
+          <a:lnRef idx="2">
+            <a:schemeClr val="accent1">
+              <a:shade val="50000"/>
+            </a:schemeClr>
+          </a:lnRef>
+          <a:fillRef idx="1">
+            <a:schemeClr val="accent1"/>
+          </a:fillRef>
+          <a:effectRef idx="0">
+            <a:schemeClr val="accent1"/>
+          </a:effectRef>
+          <a:fontRef idx="minor">
+            <a:schemeClr val="lt1"/>
+          </a:fontRef>
+        </p:style>
+        <p:txBody>
+          <a:bodyPr rtlCol="0" anchor="ctr"/>
+          <a:lstStyle/>
+          <a:p>
+            <a:pPr algn="ctr"/>
+            <a:r>
+              <a:rPr lang="en-GB" dirty="0"/>
+              <a:t>Gazebo</a:t>
+            </a:r>
+          </a:p>
+          <a:p>
+            <a:pPr algn="ctr"/>
+            <a:endParaRPr lang="en-GB" i="1" dirty="0"/>
+          </a:p>
+          <a:p>
+            <a:pPr algn="ctr"/>
+            <a:r>
+              <a:rPr lang="en-GB" i="1" dirty="0"/>
+              <a:t>Simulator</a:t>
+            </a:r>
+          </a:p>
+        </p:txBody>
+      </p:sp>
+      <p:sp>
+        <p:nvSpPr>
+          <p:cNvPr id="5" name="Rectangle: Rounded Corners 4">
+            <a:extLst>
+              <a:ext uri="{FF2B5EF4-FFF2-40B4-BE49-F238E27FC236}">
+                <a16:creationId xmlns:a16="http://schemas.microsoft.com/office/drawing/2014/main" id="{4FF9ECB1-F5C1-49EB-8143-4F4754FECBC4}"/>
+              </a:ext>
+            </a:extLst>
+          </p:cNvPr>
+          <p:cNvSpPr/>
+          <p:nvPr/>
+        </p:nvSpPr>
+        <p:spPr>
+          <a:xfrm>
+            <a:off x="8140808" y="3855443"/>
+            <a:ext cx="1847850" cy="1377594"/>
+          </a:xfrm>
+          <a:prstGeom prst="roundRect">
+            <a:avLst/>
+          </a:prstGeom>
+        </p:spPr>
+        <p:style>
+          <a:lnRef idx="2">
+            <a:schemeClr val="accent1">
+              <a:shade val="50000"/>
+            </a:schemeClr>
+          </a:lnRef>
+          <a:fillRef idx="1">
+            <a:schemeClr val="accent1"/>
+          </a:fillRef>
+          <a:effectRef idx="0">
+            <a:schemeClr val="accent1"/>
+          </a:effectRef>
+          <a:fontRef idx="minor">
+            <a:schemeClr val="lt1"/>
+          </a:fontRef>
+        </p:style>
+        <p:txBody>
+          <a:bodyPr rtlCol="0" anchor="ctr"/>
+          <a:lstStyle/>
+          <a:p>
+            <a:pPr algn="ctr"/>
+            <a:r>
+              <a:rPr lang="en-GB" dirty="0" err="1"/>
+              <a:t>Ardupilot</a:t>
+            </a:r>
+            <a:endParaRPr lang="en-GB" dirty="0"/>
+          </a:p>
+          <a:p>
+            <a:pPr algn="ctr"/>
+            <a:endParaRPr lang="en-GB" dirty="0"/>
+          </a:p>
+          <a:p>
+            <a:pPr algn="ctr"/>
+            <a:r>
+              <a:rPr lang="en-GB" i="1" dirty="0"/>
+              <a:t>Autopilot</a:t>
+            </a:r>
+          </a:p>
+        </p:txBody>
+      </p:sp>
+      <p:sp>
+        <p:nvSpPr>
+          <p:cNvPr id="6" name="Rectangle: Rounded Corners 5">
+            <a:extLst>
+              <a:ext uri="{FF2B5EF4-FFF2-40B4-BE49-F238E27FC236}">
+                <a16:creationId xmlns:a16="http://schemas.microsoft.com/office/drawing/2014/main" id="{E0AF46E2-28A2-41F1-A252-7BD226F12B6F}"/>
+              </a:ext>
+            </a:extLst>
+          </p:cNvPr>
+          <p:cNvSpPr/>
+          <p:nvPr/>
+        </p:nvSpPr>
+        <p:spPr>
+          <a:xfrm>
+            <a:off x="5190752" y="3855442"/>
+            <a:ext cx="1847850" cy="1377594"/>
+          </a:xfrm>
+          <a:prstGeom prst="roundRect">
+            <a:avLst/>
+          </a:prstGeom>
+        </p:spPr>
+        <p:style>
+          <a:lnRef idx="2">
+            <a:schemeClr val="accent1">
+              <a:shade val="50000"/>
+            </a:schemeClr>
+          </a:lnRef>
+          <a:fillRef idx="1">
+            <a:schemeClr val="accent1"/>
+          </a:fillRef>
+          <a:effectRef idx="0">
+            <a:schemeClr val="accent1"/>
+          </a:effectRef>
+          <a:fontRef idx="minor">
+            <a:schemeClr val="lt1"/>
+          </a:fontRef>
+        </p:style>
+        <p:txBody>
+          <a:bodyPr rtlCol="0" anchor="ctr"/>
+          <a:lstStyle/>
+          <a:p>
+            <a:pPr algn="ctr"/>
+            <a:r>
+              <a:rPr lang="en-GB" dirty="0"/>
+              <a:t>MAVROS</a:t>
+            </a:r>
+          </a:p>
+          <a:p>
+            <a:pPr algn="ctr"/>
+            <a:endParaRPr lang="en-GB" dirty="0"/>
+          </a:p>
+          <a:p>
+            <a:pPr algn="ctr"/>
+            <a:r>
+              <a:rPr lang="en-GB" i="1" dirty="0"/>
+              <a:t>Converter</a:t>
+            </a:r>
+          </a:p>
+        </p:txBody>
+      </p:sp>
+      <p:sp>
+        <p:nvSpPr>
+          <p:cNvPr id="7" name="Rectangle: Rounded Corners 6">
+            <a:extLst>
+              <a:ext uri="{FF2B5EF4-FFF2-40B4-BE49-F238E27FC236}">
+                <a16:creationId xmlns:a16="http://schemas.microsoft.com/office/drawing/2014/main" id="{678365ED-44B9-45A0-89FC-4E93A977AF1B}"/>
+              </a:ext>
+            </a:extLst>
+          </p:cNvPr>
+          <p:cNvSpPr/>
+          <p:nvPr/>
+        </p:nvSpPr>
+        <p:spPr>
+          <a:xfrm>
+            <a:off x="2329837" y="3855442"/>
+            <a:ext cx="1847850" cy="1377595"/>
+          </a:xfrm>
+          <a:prstGeom prst="roundRect">
+            <a:avLst/>
+          </a:prstGeom>
+          <a:solidFill>
+            <a:schemeClr val="accent2"/>
+          </a:solidFill>
+        </p:spPr>
+        <p:style>
+          <a:lnRef idx="2">
+            <a:schemeClr val="accent1">
+              <a:shade val="50000"/>
+            </a:schemeClr>
+          </a:lnRef>
+          <a:fillRef idx="1">
+            <a:schemeClr val="accent1"/>
+          </a:fillRef>
+          <a:effectRef idx="0">
+            <a:schemeClr val="accent1"/>
+          </a:effectRef>
+          <a:fontRef idx="minor">
+            <a:schemeClr val="lt1"/>
+          </a:fontRef>
+        </p:style>
+        <p:txBody>
+          <a:bodyPr rtlCol="0" anchor="ctr"/>
+          <a:lstStyle/>
+          <a:p>
+            <a:pPr algn="ctr"/>
+            <a:r>
+              <a:rPr lang="en-GB" dirty="0"/>
+              <a:t>Your code</a:t>
+            </a:r>
+          </a:p>
+          <a:p>
+            <a:pPr algn="ctr"/>
+            <a:endParaRPr lang="en-GB" dirty="0"/>
+          </a:p>
+          <a:p>
+            <a:pPr algn="ctr"/>
+            <a:r>
+              <a:rPr lang="en-GB" i="1" dirty="0"/>
+              <a:t>Controller</a:t>
+            </a:r>
+          </a:p>
+        </p:txBody>
+      </p:sp>
+      <p:sp>
+        <p:nvSpPr>
+          <p:cNvPr id="8" name="Rectangle: Rounded Corners 7">
+            <a:extLst>
+              <a:ext uri="{FF2B5EF4-FFF2-40B4-BE49-F238E27FC236}">
+                <a16:creationId xmlns:a16="http://schemas.microsoft.com/office/drawing/2014/main" id="{7A7830B0-F4FA-4917-B89F-485DB233C8A6}"/>
+              </a:ext>
+            </a:extLst>
+          </p:cNvPr>
+          <p:cNvSpPr/>
+          <p:nvPr/>
+        </p:nvSpPr>
+        <p:spPr>
+          <a:xfrm>
+            <a:off x="2045642" y="2222858"/>
+            <a:ext cx="1847850" cy="1377594"/>
+          </a:xfrm>
+          <a:prstGeom prst="roundRect">
+            <a:avLst/>
+          </a:prstGeom>
+          <a:solidFill>
+            <a:schemeClr val="accent2"/>
+          </a:solidFill>
+        </p:spPr>
+        <p:style>
+          <a:lnRef idx="2">
+            <a:schemeClr val="accent1">
+              <a:shade val="50000"/>
+            </a:schemeClr>
+          </a:lnRef>
+          <a:fillRef idx="1">
+            <a:schemeClr val="accent1"/>
+          </a:fillRef>
+          <a:effectRef idx="0">
+            <a:schemeClr val="accent1"/>
+          </a:effectRef>
+          <a:fontRef idx="minor">
+            <a:schemeClr val="lt1"/>
+          </a:fontRef>
+        </p:style>
+        <p:txBody>
           <a:bodyPr rtlCol="0" anchor="ctr"/>
           <a:lstStyle/>
           <a:p>
@@ -4014,7 +4691,7 @@
         </p:nvCxnSpPr>
         <p:spPr>
           <a:xfrm>
-            <a:off x="6893822" y="3721279"/>
+            <a:off x="7038602" y="4544239"/>
             <a:ext cx="1102206" cy="1"/>
           </a:xfrm>
           <a:prstGeom prst="line">
@@ -4054,7 +4731,7 @@
         </p:nvSpPr>
         <p:spPr>
           <a:xfrm>
-            <a:off x="6868319" y="3244334"/>
+            <a:off x="7013099" y="4193959"/>
             <a:ext cx="1153213" cy="369332"/>
           </a:xfrm>
           <a:prstGeom prst="rect">
@@ -4090,7 +4767,7 @@
         </p:nvSpPr>
         <p:spPr>
           <a:xfrm>
-            <a:off x="9792871" y="3244334"/>
+            <a:off x="9937651" y="4193959"/>
             <a:ext cx="1153213" cy="369332"/>
           </a:xfrm>
           <a:prstGeom prst="rect">
@@ -4130,7 +4807,7 @@
         </p:nvCxnSpPr>
         <p:spPr>
           <a:xfrm>
-            <a:off x="9843878" y="3721280"/>
+            <a:off x="9988658" y="4544240"/>
             <a:ext cx="1102206" cy="0"/>
           </a:xfrm>
           <a:prstGeom prst="line">
@@ -4161,6 +4838,709 @@
           </a:fontRef>
         </p:style>
       </p:cxnSp>
+      <p:sp>
+        <p:nvSpPr>
+          <p:cNvPr id="13" name="Rectangle: Rounded Corners 12">
+            <a:extLst>
+              <a:ext uri="{FF2B5EF4-FFF2-40B4-BE49-F238E27FC236}">
+                <a16:creationId xmlns:a16="http://schemas.microsoft.com/office/drawing/2014/main" id="{E5EA8537-2C75-48D3-9B81-E62F905CBDE9}"/>
+              </a:ext>
+            </a:extLst>
+          </p:cNvPr>
+          <p:cNvSpPr/>
+          <p:nvPr/>
+        </p:nvSpPr>
+        <p:spPr>
+          <a:xfrm>
+            <a:off x="-709360" y="3855442"/>
+            <a:ext cx="1847850" cy="1377594"/>
+          </a:xfrm>
+          <a:prstGeom prst="roundRect">
+            <a:avLst/>
+          </a:prstGeom>
+        </p:spPr>
+        <p:style>
+          <a:lnRef idx="2">
+            <a:schemeClr val="accent1">
+              <a:shade val="50000"/>
+            </a:schemeClr>
+          </a:lnRef>
+          <a:fillRef idx="1">
+            <a:schemeClr val="accent1"/>
+          </a:fillRef>
+          <a:effectRef idx="0">
+            <a:schemeClr val="accent1"/>
+          </a:effectRef>
+          <a:fontRef idx="minor">
+            <a:schemeClr val="lt1"/>
+          </a:fontRef>
+        </p:style>
+        <p:txBody>
+          <a:bodyPr rtlCol="0" anchor="ctr"/>
+          <a:lstStyle/>
+          <a:p>
+            <a:pPr algn="ctr"/>
+            <a:r>
+              <a:rPr lang="en-GB" dirty="0" err="1"/>
+              <a:t>rosbridge</a:t>
+            </a:r>
+            <a:endParaRPr lang="en-GB" dirty="0"/>
+          </a:p>
+          <a:p>
+            <a:pPr algn="ctr"/>
+            <a:endParaRPr lang="en-GB" dirty="0"/>
+          </a:p>
+          <a:p>
+            <a:pPr algn="ctr"/>
+            <a:r>
+              <a:rPr lang="en-GB" i="1" dirty="0"/>
+              <a:t>Interface</a:t>
+            </a:r>
+          </a:p>
+        </p:txBody>
+      </p:sp>
+      <p:cxnSp>
+        <p:nvCxnSpPr>
+          <p:cNvPr id="19" name="Straight Connector 18">
+            <a:extLst>
+              <a:ext uri="{FF2B5EF4-FFF2-40B4-BE49-F238E27FC236}">
+                <a16:creationId xmlns:a16="http://schemas.microsoft.com/office/drawing/2014/main" id="{9E45FA31-6C53-43C4-8B0F-7E3A4DF93522}"/>
+              </a:ext>
+            </a:extLst>
+          </p:cNvPr>
+          <p:cNvCxnSpPr>
+            <a:cxnSpLocks/>
+          </p:cNvCxnSpPr>
+          <p:nvPr/>
+        </p:nvCxnSpPr>
+        <p:spPr>
+          <a:xfrm>
+            <a:off x="-709360" y="5494568"/>
+            <a:ext cx="13648074" cy="0"/>
+          </a:xfrm>
+          <a:prstGeom prst="line">
+            <a:avLst/>
+          </a:prstGeom>
+        </p:spPr>
+        <p:style>
+          <a:lnRef idx="3">
+            <a:schemeClr val="accent6"/>
+          </a:lnRef>
+          <a:fillRef idx="0">
+            <a:schemeClr val="accent6"/>
+          </a:fillRef>
+          <a:effectRef idx="2">
+            <a:schemeClr val="accent6"/>
+          </a:effectRef>
+          <a:fontRef idx="minor">
+            <a:schemeClr val="tx1"/>
+          </a:fontRef>
+        </p:style>
+      </p:cxnSp>
+      <p:cxnSp>
+        <p:nvCxnSpPr>
+          <p:cNvPr id="22" name="Straight Arrow Connector 21">
+            <a:extLst>
+              <a:ext uri="{FF2B5EF4-FFF2-40B4-BE49-F238E27FC236}">
+                <a16:creationId xmlns:a16="http://schemas.microsoft.com/office/drawing/2014/main" id="{6CE1ED56-F664-482F-909B-0AA5AEDE1B9C}"/>
+              </a:ext>
+            </a:extLst>
+          </p:cNvPr>
+          <p:cNvCxnSpPr>
+            <a:cxnSpLocks/>
+            <a:stCxn id="6" idx="2"/>
+          </p:cNvCxnSpPr>
+          <p:nvPr/>
+        </p:nvCxnSpPr>
+        <p:spPr>
+          <a:xfrm>
+            <a:off x="6114677" y="5233036"/>
+            <a:ext cx="0" cy="261532"/>
+          </a:xfrm>
+          <a:prstGeom prst="straightConnector1">
+            <a:avLst/>
+          </a:prstGeom>
+          <a:ln>
+            <a:headEnd type="triangle" w="med" len="med"/>
+            <a:tailEnd type="triangle" w="med" len="med"/>
+          </a:ln>
+        </p:spPr>
+        <p:style>
+          <a:lnRef idx="3">
+            <a:schemeClr val="accent6"/>
+          </a:lnRef>
+          <a:fillRef idx="0">
+            <a:schemeClr val="accent6"/>
+          </a:fillRef>
+          <a:effectRef idx="2">
+            <a:schemeClr val="accent6"/>
+          </a:effectRef>
+          <a:fontRef idx="minor">
+            <a:schemeClr val="tx1"/>
+          </a:fontRef>
+        </p:style>
+      </p:cxnSp>
+      <p:cxnSp>
+        <p:nvCxnSpPr>
+          <p:cNvPr id="24" name="Straight Arrow Connector 23">
+            <a:extLst>
+              <a:ext uri="{FF2B5EF4-FFF2-40B4-BE49-F238E27FC236}">
+                <a16:creationId xmlns:a16="http://schemas.microsoft.com/office/drawing/2014/main" id="{A67F0976-2817-4863-9F47-C666758C1455}"/>
+              </a:ext>
+            </a:extLst>
+          </p:cNvPr>
+          <p:cNvCxnSpPr>
+            <a:cxnSpLocks/>
+          </p:cNvCxnSpPr>
+          <p:nvPr/>
+        </p:nvCxnSpPr>
+        <p:spPr>
+          <a:xfrm>
+            <a:off x="3171868" y="5233036"/>
+            <a:ext cx="0" cy="261532"/>
+          </a:xfrm>
+          <a:prstGeom prst="straightConnector1">
+            <a:avLst/>
+          </a:prstGeom>
+          <a:ln>
+            <a:headEnd type="triangle" w="med" len="med"/>
+            <a:tailEnd type="triangle" w="med" len="med"/>
+          </a:ln>
+        </p:spPr>
+        <p:style>
+          <a:lnRef idx="3">
+            <a:schemeClr val="accent6"/>
+          </a:lnRef>
+          <a:fillRef idx="0">
+            <a:schemeClr val="accent6"/>
+          </a:fillRef>
+          <a:effectRef idx="2">
+            <a:schemeClr val="accent6"/>
+          </a:effectRef>
+          <a:fontRef idx="minor">
+            <a:schemeClr val="tx1"/>
+          </a:fontRef>
+        </p:style>
+      </p:cxnSp>
+      <p:cxnSp>
+        <p:nvCxnSpPr>
+          <p:cNvPr id="26" name="Straight Arrow Connector 25">
+            <a:extLst>
+              <a:ext uri="{FF2B5EF4-FFF2-40B4-BE49-F238E27FC236}">
+                <a16:creationId xmlns:a16="http://schemas.microsoft.com/office/drawing/2014/main" id="{6BE4D7AC-2E88-47C5-B17B-982EEEF13416}"/>
+              </a:ext>
+            </a:extLst>
+          </p:cNvPr>
+          <p:cNvCxnSpPr>
+            <a:cxnSpLocks/>
+          </p:cNvCxnSpPr>
+          <p:nvPr/>
+        </p:nvCxnSpPr>
+        <p:spPr>
+          <a:xfrm>
+            <a:off x="12031561" y="5233036"/>
+            <a:ext cx="0" cy="261532"/>
+          </a:xfrm>
+          <a:prstGeom prst="straightConnector1">
+            <a:avLst/>
+          </a:prstGeom>
+          <a:ln>
+            <a:headEnd type="triangle" w="med" len="med"/>
+            <a:tailEnd type="triangle" w="med" len="med"/>
+          </a:ln>
+        </p:spPr>
+        <p:style>
+          <a:lnRef idx="3">
+            <a:schemeClr val="accent6"/>
+          </a:lnRef>
+          <a:fillRef idx="0">
+            <a:schemeClr val="accent6"/>
+          </a:fillRef>
+          <a:effectRef idx="2">
+            <a:schemeClr val="accent6"/>
+          </a:effectRef>
+          <a:fontRef idx="minor">
+            <a:schemeClr val="tx1"/>
+          </a:fontRef>
+        </p:style>
+      </p:cxnSp>
+      <p:cxnSp>
+        <p:nvCxnSpPr>
+          <p:cNvPr id="27" name="Straight Arrow Connector 26">
+            <a:extLst>
+              <a:ext uri="{FF2B5EF4-FFF2-40B4-BE49-F238E27FC236}">
+                <a16:creationId xmlns:a16="http://schemas.microsoft.com/office/drawing/2014/main" id="{8CEF7035-DA90-427A-92DF-FA61B55053A8}"/>
+              </a:ext>
+            </a:extLst>
+          </p:cNvPr>
+          <p:cNvCxnSpPr>
+            <a:cxnSpLocks/>
+          </p:cNvCxnSpPr>
+          <p:nvPr/>
+        </p:nvCxnSpPr>
+        <p:spPr>
+          <a:xfrm>
+            <a:off x="231753" y="5233036"/>
+            <a:ext cx="0" cy="261532"/>
+          </a:xfrm>
+          <a:prstGeom prst="straightConnector1">
+            <a:avLst/>
+          </a:prstGeom>
+          <a:ln>
+            <a:headEnd type="triangle" w="med" len="med"/>
+            <a:tailEnd type="triangle" w="med" len="med"/>
+          </a:ln>
+        </p:spPr>
+        <p:style>
+          <a:lnRef idx="3">
+            <a:schemeClr val="accent6"/>
+          </a:lnRef>
+          <a:fillRef idx="0">
+            <a:schemeClr val="accent6"/>
+          </a:fillRef>
+          <a:effectRef idx="2">
+            <a:schemeClr val="accent6"/>
+          </a:effectRef>
+          <a:fontRef idx="minor">
+            <a:schemeClr val="tx1"/>
+          </a:fontRef>
+        </p:style>
+      </p:cxnSp>
+      <p:sp>
+        <p:nvSpPr>
+          <p:cNvPr id="30" name="TextBox 29">
+            <a:extLst>
+              <a:ext uri="{FF2B5EF4-FFF2-40B4-BE49-F238E27FC236}">
+                <a16:creationId xmlns:a16="http://schemas.microsoft.com/office/drawing/2014/main" id="{7D3EEBE1-653C-4211-9936-8F365ED8DDE7}"/>
+              </a:ext>
+            </a:extLst>
+          </p:cNvPr>
+          <p:cNvSpPr txBox="1"/>
+          <p:nvPr/>
+        </p:nvSpPr>
+        <p:spPr>
+          <a:xfrm>
+            <a:off x="4054312" y="5178028"/>
+            <a:ext cx="1153213" cy="369332"/>
+          </a:xfrm>
+          <a:prstGeom prst="rect">
+            <a:avLst/>
+          </a:prstGeom>
+          <a:noFill/>
+        </p:spPr>
+        <p:txBody>
+          <a:bodyPr wrap="square" rtlCol="0">
+            <a:spAutoFit/>
+          </a:bodyPr>
+          <a:lstStyle/>
+          <a:p>
+            <a:pPr algn="ctr"/>
+            <a:r>
+              <a:rPr lang="en-GB" dirty="0"/>
+              <a:t>ROS</a:t>
+            </a:r>
+          </a:p>
+        </p:txBody>
+      </p:sp>
+      <p:sp>
+        <p:nvSpPr>
+          <p:cNvPr id="44" name="Rectangle: Rounded Corners 43">
+            <a:extLst>
+              <a:ext uri="{FF2B5EF4-FFF2-40B4-BE49-F238E27FC236}">
+                <a16:creationId xmlns:a16="http://schemas.microsoft.com/office/drawing/2014/main" id="{07086C1C-2B50-437A-9FA2-CB0E57020287}"/>
+              </a:ext>
+            </a:extLst>
+          </p:cNvPr>
+          <p:cNvSpPr/>
+          <p:nvPr/>
+        </p:nvSpPr>
+        <p:spPr>
+          <a:xfrm>
+            <a:off x="-365738" y="172567"/>
+            <a:ext cx="1847850" cy="781864"/>
+          </a:xfrm>
+          <a:prstGeom prst="roundRect">
+            <a:avLst/>
+          </a:prstGeom>
+          <a:solidFill>
+            <a:schemeClr val="accent6">
+              <a:lumMod val="75000"/>
+            </a:schemeClr>
+          </a:solidFill>
+        </p:spPr>
+        <p:style>
+          <a:lnRef idx="2">
+            <a:schemeClr val="accent1">
+              <a:shade val="50000"/>
+            </a:schemeClr>
+          </a:lnRef>
+          <a:fillRef idx="1">
+            <a:schemeClr val="accent1"/>
+          </a:fillRef>
+          <a:effectRef idx="0">
+            <a:schemeClr val="accent1"/>
+          </a:effectRef>
+          <a:fontRef idx="minor">
+            <a:schemeClr val="lt1"/>
+          </a:fontRef>
+        </p:style>
+        <p:txBody>
+          <a:bodyPr rtlCol="0" anchor="ctr"/>
+          <a:lstStyle/>
+          <a:p>
+            <a:pPr algn="ctr"/>
+            <a:r>
+              <a:rPr lang="en-GB" dirty="0"/>
+              <a:t>Foxglove</a:t>
+            </a:r>
+            <a:endParaRPr lang="en-GB" i="1" dirty="0"/>
+          </a:p>
+        </p:txBody>
+      </p:sp>
+      <p:sp>
+        <p:nvSpPr>
+          <p:cNvPr id="45" name="Rectangle: Rounded Corners 44">
+            <a:extLst>
+              <a:ext uri="{FF2B5EF4-FFF2-40B4-BE49-F238E27FC236}">
+                <a16:creationId xmlns:a16="http://schemas.microsoft.com/office/drawing/2014/main" id="{A43B6B08-BFC9-47F3-81C8-81C7E2F54812}"/>
+              </a:ext>
+            </a:extLst>
+          </p:cNvPr>
+          <p:cNvSpPr/>
+          <p:nvPr/>
+        </p:nvSpPr>
+        <p:spPr>
+          <a:xfrm>
+            <a:off x="8485568" y="172567"/>
+            <a:ext cx="1847850" cy="781864"/>
+          </a:xfrm>
+          <a:prstGeom prst="roundRect">
+            <a:avLst/>
+          </a:prstGeom>
+          <a:solidFill>
+            <a:schemeClr val="accent6">
+              <a:lumMod val="75000"/>
+            </a:schemeClr>
+          </a:solidFill>
+        </p:spPr>
+        <p:style>
+          <a:lnRef idx="2">
+            <a:schemeClr val="accent1">
+              <a:shade val="50000"/>
+            </a:schemeClr>
+          </a:lnRef>
+          <a:fillRef idx="1">
+            <a:schemeClr val="accent1"/>
+          </a:fillRef>
+          <a:effectRef idx="0">
+            <a:schemeClr val="accent1"/>
+          </a:effectRef>
+          <a:fontRef idx="minor">
+            <a:schemeClr val="lt1"/>
+          </a:fontRef>
+        </p:style>
+        <p:txBody>
+          <a:bodyPr rtlCol="0" anchor="ctr"/>
+          <a:lstStyle/>
+          <a:p>
+            <a:pPr algn="ctr"/>
+            <a:r>
+              <a:rPr lang="en-GB" dirty="0" err="1"/>
+              <a:t>QGroundControl</a:t>
+            </a:r>
+            <a:endParaRPr lang="en-GB" i="1" dirty="0"/>
+          </a:p>
+        </p:txBody>
+      </p:sp>
+      <p:sp>
+        <p:nvSpPr>
+          <p:cNvPr id="46" name="Rectangle: Rounded Corners 45">
+            <a:extLst>
+              <a:ext uri="{FF2B5EF4-FFF2-40B4-BE49-F238E27FC236}">
+                <a16:creationId xmlns:a16="http://schemas.microsoft.com/office/drawing/2014/main" id="{67C12D2E-0F9B-4561-8A55-4987C11C96DF}"/>
+              </a:ext>
+            </a:extLst>
+          </p:cNvPr>
+          <p:cNvSpPr/>
+          <p:nvPr/>
+        </p:nvSpPr>
+        <p:spPr>
+          <a:xfrm>
+            <a:off x="11430580" y="172567"/>
+            <a:ext cx="1847850" cy="781864"/>
+          </a:xfrm>
+          <a:prstGeom prst="roundRect">
+            <a:avLst/>
+          </a:prstGeom>
+          <a:solidFill>
+            <a:schemeClr val="accent6">
+              <a:lumMod val="75000"/>
+            </a:schemeClr>
+          </a:solidFill>
+        </p:spPr>
+        <p:style>
+          <a:lnRef idx="2">
+            <a:schemeClr val="accent1">
+              <a:shade val="50000"/>
+            </a:schemeClr>
+          </a:lnRef>
+          <a:fillRef idx="1">
+            <a:schemeClr val="accent1"/>
+          </a:fillRef>
+          <a:effectRef idx="0">
+            <a:schemeClr val="accent1"/>
+          </a:effectRef>
+          <a:fontRef idx="minor">
+            <a:schemeClr val="lt1"/>
+          </a:fontRef>
+        </p:style>
+        <p:txBody>
+          <a:bodyPr rtlCol="0" anchor="ctr"/>
+          <a:lstStyle/>
+          <a:p>
+            <a:pPr algn="ctr"/>
+            <a:r>
+              <a:rPr lang="en-GB" dirty="0" err="1"/>
+              <a:t>Gzweb</a:t>
+            </a:r>
+            <a:r>
+              <a:rPr lang="en-GB" dirty="0"/>
+              <a:t> (browser)</a:t>
+            </a:r>
+            <a:endParaRPr lang="en-GB" i="1" dirty="0"/>
+          </a:p>
+        </p:txBody>
+      </p:sp>
+      <p:cxnSp>
+        <p:nvCxnSpPr>
+          <p:cNvPr id="48" name="Straight Arrow Connector 47">
+            <a:extLst>
+              <a:ext uri="{FF2B5EF4-FFF2-40B4-BE49-F238E27FC236}">
+                <a16:creationId xmlns:a16="http://schemas.microsoft.com/office/drawing/2014/main" id="{C1CC229C-0FC7-41C2-AFF3-71033AC634F6}"/>
+              </a:ext>
+            </a:extLst>
+          </p:cNvPr>
+          <p:cNvCxnSpPr>
+            <a:stCxn id="44" idx="2"/>
+          </p:cNvCxnSpPr>
+          <p:nvPr/>
+        </p:nvCxnSpPr>
+        <p:spPr>
+          <a:xfrm>
+            <a:off x="558187" y="954431"/>
+            <a:ext cx="0" cy="2901010"/>
+          </a:xfrm>
+          <a:prstGeom prst="straightConnector1">
+            <a:avLst/>
+          </a:prstGeom>
+          <a:ln>
+            <a:headEnd type="triangle" w="med" len="med"/>
+            <a:tailEnd type="triangle" w="med" len="med"/>
+          </a:ln>
+        </p:spPr>
+        <p:style>
+          <a:lnRef idx="2">
+            <a:schemeClr val="dk1"/>
+          </a:lnRef>
+          <a:fillRef idx="0">
+            <a:schemeClr val="dk1"/>
+          </a:fillRef>
+          <a:effectRef idx="1">
+            <a:schemeClr val="dk1"/>
+          </a:effectRef>
+          <a:fontRef idx="minor">
+            <a:schemeClr val="tx1"/>
+          </a:fontRef>
+        </p:style>
+      </p:cxnSp>
+      <p:cxnSp>
+        <p:nvCxnSpPr>
+          <p:cNvPr id="49" name="Straight Arrow Connector 48">
+            <a:extLst>
+              <a:ext uri="{FF2B5EF4-FFF2-40B4-BE49-F238E27FC236}">
+                <a16:creationId xmlns:a16="http://schemas.microsoft.com/office/drawing/2014/main" id="{A87F7706-A99D-41B2-84C6-35E3FD918EEA}"/>
+              </a:ext>
+            </a:extLst>
+          </p:cNvPr>
+          <p:cNvCxnSpPr/>
+          <p:nvPr/>
+        </p:nvCxnSpPr>
+        <p:spPr>
+          <a:xfrm>
+            <a:off x="9409493" y="954431"/>
+            <a:ext cx="0" cy="2901010"/>
+          </a:xfrm>
+          <a:prstGeom prst="straightConnector1">
+            <a:avLst/>
+          </a:prstGeom>
+          <a:ln>
+            <a:headEnd type="triangle" w="med" len="med"/>
+            <a:tailEnd type="triangle" w="med" len="med"/>
+          </a:ln>
+        </p:spPr>
+        <p:style>
+          <a:lnRef idx="2">
+            <a:schemeClr val="dk1"/>
+          </a:lnRef>
+          <a:fillRef idx="0">
+            <a:schemeClr val="dk1"/>
+          </a:fillRef>
+          <a:effectRef idx="1">
+            <a:schemeClr val="dk1"/>
+          </a:effectRef>
+          <a:fontRef idx="minor">
+            <a:schemeClr val="tx1"/>
+          </a:fontRef>
+        </p:style>
+      </p:cxnSp>
+      <p:cxnSp>
+        <p:nvCxnSpPr>
+          <p:cNvPr id="50" name="Straight Arrow Connector 49">
+            <a:extLst>
+              <a:ext uri="{FF2B5EF4-FFF2-40B4-BE49-F238E27FC236}">
+                <a16:creationId xmlns:a16="http://schemas.microsoft.com/office/drawing/2014/main" id="{49C3C5CC-0769-4910-9A61-6BFDAFD55A5E}"/>
+              </a:ext>
+            </a:extLst>
+          </p:cNvPr>
+          <p:cNvCxnSpPr/>
+          <p:nvPr/>
+        </p:nvCxnSpPr>
+        <p:spPr>
+          <a:xfrm>
+            <a:off x="12354505" y="954431"/>
+            <a:ext cx="0" cy="2901010"/>
+          </a:xfrm>
+          <a:prstGeom prst="straightConnector1">
+            <a:avLst/>
+          </a:prstGeom>
+          <a:ln>
+            <a:headEnd type="triangle" w="med" len="med"/>
+            <a:tailEnd type="triangle" w="med" len="med"/>
+          </a:ln>
+        </p:spPr>
+        <p:style>
+          <a:lnRef idx="2">
+            <a:schemeClr val="dk1"/>
+          </a:lnRef>
+          <a:fillRef idx="0">
+            <a:schemeClr val="dk1"/>
+          </a:fillRef>
+          <a:effectRef idx="1">
+            <a:schemeClr val="dk1"/>
+          </a:effectRef>
+          <a:fontRef idx="minor">
+            <a:schemeClr val="tx1"/>
+          </a:fontRef>
+        </p:style>
+      </p:cxnSp>
+      <p:sp>
+        <p:nvSpPr>
+          <p:cNvPr id="51" name="TextBox 50">
+            <a:extLst>
+              <a:ext uri="{FF2B5EF4-FFF2-40B4-BE49-F238E27FC236}">
+                <a16:creationId xmlns:a16="http://schemas.microsoft.com/office/drawing/2014/main" id="{FC430237-44AF-403D-9864-ED24ED50DF23}"/>
+              </a:ext>
+            </a:extLst>
+          </p:cNvPr>
+          <p:cNvSpPr txBox="1"/>
+          <p:nvPr/>
+        </p:nvSpPr>
+        <p:spPr>
+          <a:xfrm>
+            <a:off x="11150742" y="1277138"/>
+            <a:ext cx="1203763" cy="369332"/>
+          </a:xfrm>
+          <a:prstGeom prst="rect">
+            <a:avLst/>
+          </a:prstGeom>
+          <a:noFill/>
+        </p:spPr>
+        <p:txBody>
+          <a:bodyPr wrap="square" rtlCol="0">
+            <a:spAutoFit/>
+          </a:bodyPr>
+          <a:lstStyle/>
+          <a:p>
+            <a:pPr algn="r"/>
+            <a:r>
+              <a:rPr lang="en-GB" dirty="0"/>
+              <a:t>Port 8080</a:t>
+            </a:r>
+          </a:p>
+        </p:txBody>
+      </p:sp>
+      <p:sp>
+        <p:nvSpPr>
+          <p:cNvPr id="53" name="TextBox 52">
+            <a:extLst>
+              <a:ext uri="{FF2B5EF4-FFF2-40B4-BE49-F238E27FC236}">
+                <a16:creationId xmlns:a16="http://schemas.microsoft.com/office/drawing/2014/main" id="{CEE2B5D6-7893-4341-B3EF-84B3EBCCC36A}"/>
+              </a:ext>
+            </a:extLst>
+          </p:cNvPr>
+          <p:cNvSpPr txBox="1"/>
+          <p:nvPr/>
+        </p:nvSpPr>
+        <p:spPr>
+          <a:xfrm>
+            <a:off x="8205730" y="1277138"/>
+            <a:ext cx="1203763" cy="369332"/>
+          </a:xfrm>
+          <a:prstGeom prst="rect">
+            <a:avLst/>
+          </a:prstGeom>
+          <a:noFill/>
+        </p:spPr>
+        <p:txBody>
+          <a:bodyPr wrap="square" rtlCol="0">
+            <a:spAutoFit/>
+          </a:bodyPr>
+          <a:lstStyle/>
+          <a:p>
+            <a:pPr algn="r"/>
+            <a:r>
+              <a:rPr lang="en-GB" dirty="0"/>
+              <a:t>Port 5761</a:t>
+            </a:r>
+          </a:p>
+        </p:txBody>
+      </p:sp>
+      <p:sp>
+        <p:nvSpPr>
+          <p:cNvPr id="54" name="TextBox 53">
+            <a:extLst>
+              <a:ext uri="{FF2B5EF4-FFF2-40B4-BE49-F238E27FC236}">
+                <a16:creationId xmlns:a16="http://schemas.microsoft.com/office/drawing/2014/main" id="{FDF4809F-863E-4D3C-B892-743CA6989B8F}"/>
+              </a:ext>
+            </a:extLst>
+          </p:cNvPr>
+          <p:cNvSpPr txBox="1"/>
+          <p:nvPr/>
+        </p:nvSpPr>
+        <p:spPr>
+          <a:xfrm>
+            <a:off x="-601882" y="1277138"/>
+            <a:ext cx="1203763" cy="369332"/>
+          </a:xfrm>
+          <a:prstGeom prst="rect">
+            <a:avLst/>
+          </a:prstGeom>
+          <a:noFill/>
+        </p:spPr>
+        <p:txBody>
+          <a:bodyPr wrap="square" rtlCol="0">
+            <a:spAutoFit/>
+          </a:bodyPr>
+          <a:lstStyle/>
+          <a:p>
+            <a:pPr algn="r"/>
+            <a:r>
+              <a:rPr lang="en-GB" dirty="0"/>
+              <a:t>Port 9090</a:t>
+            </a:r>
+          </a:p>
+        </p:txBody>
+      </p:sp>
     </p:spTree>
     <p:extLst>
       <p:ext uri="{BB962C8B-B14F-4D97-AF65-F5344CB8AC3E}">

</xml_diff>